<commit_message>
updated with init chapter 3 discussion
</commit_message>
<xml_diff>
--- a/chapter_notebooks/figure_editor.pptx
+++ b/chapter_notebooks/figure_editor.pptx
@@ -6,7 +6,10 @@
   </p:sldMasterIdLst>
   <p:sldIdLst>
     <p:sldId id="256" r:id="rId2"/>
-    <p:sldId id="259" r:id="rId3"/>
+    <p:sldId id="260" r:id="rId3"/>
+    <p:sldId id="259" r:id="rId4"/>
+    <p:sldId id="261" r:id="rId5"/>
+    <p:sldId id="262" r:id="rId6"/>
   </p:sldIdLst>
   <p:sldSz cx="12192000" cy="6858000"/>
   <p:notesSz cx="6858000" cy="9144000"/>
@@ -111,14 +114,20 @@
         <p14:section name="Default Section" id="{00F0284F-19C8-4C49-9A90-6682E2DA5F40}">
           <p14:sldIdLst>
             <p14:sldId id="256"/>
+            <p14:sldId id="260"/>
           </p14:sldIdLst>
         </p14:section>
         <p14:section name="Untitled Section" id="{37EC5616-93AE-4F1E-9DD6-D4D92DB4F7DF}">
           <p14:sldIdLst>
             <p14:sldId id="259"/>
+            <p14:sldId id="261"/>
+            <p14:sldId id="262"/>
           </p14:sldIdLst>
         </p14:section>
       </p14:sectionLst>
+    </p:ext>
+    <p:ext uri="{EFAFB233-063F-42B5-8137-9DF3F51BA10A}">
+      <p15:sldGuideLst xmlns:p15="http://schemas.microsoft.com/office/powerpoint/2012/main"/>
     </p:ext>
   </p:extLst>
 </p:presentation>
@@ -271,7 +280,7 @@
           <a:p>
             <a:fld id="{0DF22B33-D0CB-4F00-A021-D190DB541D3D}" type="datetimeFigureOut">
               <a:rPr lang="en-US" smtClean="0"/>
-              <a:t>7/20/2024</a:t>
+              <a:t>7/28/2024</a:t>
             </a:fld>
             <a:endParaRPr lang="en-US"/>
           </a:p>
@@ -469,7 +478,7 @@
           <a:p>
             <a:fld id="{0DF22B33-D0CB-4F00-A021-D190DB541D3D}" type="datetimeFigureOut">
               <a:rPr lang="en-US" smtClean="0"/>
-              <a:t>7/20/2024</a:t>
+              <a:t>7/28/2024</a:t>
             </a:fld>
             <a:endParaRPr lang="en-US"/>
           </a:p>
@@ -677,7 +686,7 @@
           <a:p>
             <a:fld id="{0DF22B33-D0CB-4F00-A021-D190DB541D3D}" type="datetimeFigureOut">
               <a:rPr lang="en-US" smtClean="0"/>
-              <a:t>7/20/2024</a:t>
+              <a:t>7/28/2024</a:t>
             </a:fld>
             <a:endParaRPr lang="en-US"/>
           </a:p>
@@ -875,7 +884,7 @@
           <a:p>
             <a:fld id="{0DF22B33-D0CB-4F00-A021-D190DB541D3D}" type="datetimeFigureOut">
               <a:rPr lang="en-US" smtClean="0"/>
-              <a:t>7/20/2024</a:t>
+              <a:t>7/28/2024</a:t>
             </a:fld>
             <a:endParaRPr lang="en-US"/>
           </a:p>
@@ -1150,7 +1159,7 @@
           <a:p>
             <a:fld id="{0DF22B33-D0CB-4F00-A021-D190DB541D3D}" type="datetimeFigureOut">
               <a:rPr lang="en-US" smtClean="0"/>
-              <a:t>7/20/2024</a:t>
+              <a:t>7/28/2024</a:t>
             </a:fld>
             <a:endParaRPr lang="en-US"/>
           </a:p>
@@ -1415,7 +1424,7 @@
           <a:p>
             <a:fld id="{0DF22B33-D0CB-4F00-A021-D190DB541D3D}" type="datetimeFigureOut">
               <a:rPr lang="en-US" smtClean="0"/>
-              <a:t>7/20/2024</a:t>
+              <a:t>7/28/2024</a:t>
             </a:fld>
             <a:endParaRPr lang="en-US"/>
           </a:p>
@@ -1827,7 +1836,7 @@
           <a:p>
             <a:fld id="{0DF22B33-D0CB-4F00-A021-D190DB541D3D}" type="datetimeFigureOut">
               <a:rPr lang="en-US" smtClean="0"/>
-              <a:t>7/20/2024</a:t>
+              <a:t>7/28/2024</a:t>
             </a:fld>
             <a:endParaRPr lang="en-US"/>
           </a:p>
@@ -1968,7 +1977,7 @@
           <a:p>
             <a:fld id="{0DF22B33-D0CB-4F00-A021-D190DB541D3D}" type="datetimeFigureOut">
               <a:rPr lang="en-US" smtClean="0"/>
-              <a:t>7/20/2024</a:t>
+              <a:t>7/28/2024</a:t>
             </a:fld>
             <a:endParaRPr lang="en-US"/>
           </a:p>
@@ -2081,7 +2090,7 @@
           <a:p>
             <a:fld id="{0DF22B33-D0CB-4F00-A021-D190DB541D3D}" type="datetimeFigureOut">
               <a:rPr lang="en-US" smtClean="0"/>
-              <a:t>7/20/2024</a:t>
+              <a:t>7/28/2024</a:t>
             </a:fld>
             <a:endParaRPr lang="en-US"/>
           </a:p>
@@ -2392,7 +2401,7 @@
           <a:p>
             <a:fld id="{0DF22B33-D0CB-4F00-A021-D190DB541D3D}" type="datetimeFigureOut">
               <a:rPr lang="en-US" smtClean="0"/>
-              <a:t>7/20/2024</a:t>
+              <a:t>7/28/2024</a:t>
             </a:fld>
             <a:endParaRPr lang="en-US"/>
           </a:p>
@@ -2680,7 +2689,7 @@
           <a:p>
             <a:fld id="{0DF22B33-D0CB-4F00-A021-D190DB541D3D}" type="datetimeFigureOut">
               <a:rPr lang="en-US" smtClean="0"/>
-              <a:t>7/20/2024</a:t>
+              <a:t>7/28/2024</a:t>
             </a:fld>
             <a:endParaRPr lang="en-US"/>
           </a:p>
@@ -2921,7 +2930,7 @@
           <a:p>
             <a:fld id="{0DF22B33-D0CB-4F00-A021-D190DB541D3D}" type="datetimeFigureOut">
               <a:rPr lang="en-US" smtClean="0"/>
-              <a:t>7/20/2024</a:t>
+              <a:t>7/28/2024</a:t>
             </a:fld>
             <a:endParaRPr lang="en-US"/>
           </a:p>
@@ -3420,6 +3429,458 @@
       </p:grpSpPr>
       <p:pic>
         <p:nvPicPr>
+          <p:cNvPr id="4" name="Content Placeholder 8" descr="A screenshot of a computer&#10;&#10;Description automatically generated">
+            <a:extLst>
+              <a:ext uri="{FF2B5EF4-FFF2-40B4-BE49-F238E27FC236}">
+                <a16:creationId xmlns:a16="http://schemas.microsoft.com/office/drawing/2014/main" id="{7DC11E23-A45C-B35D-D50A-3B5F904522D1}"/>
+              </a:ext>
+            </a:extLst>
+          </p:cNvPr>
+          <p:cNvPicPr>
+            <a:picLocks noChangeAspect="1"/>
+          </p:cNvPicPr>
+          <p:nvPr/>
+        </p:nvPicPr>
+        <p:blipFill>
+          <a:blip r:embed="rId2">
+            <a:extLst>
+              <a:ext uri="{28A0092B-C50C-407E-A947-70E740481C1C}">
+                <a14:useLocalDpi xmlns:a14="http://schemas.microsoft.com/office/drawing/2010/main" val="0"/>
+              </a:ext>
+            </a:extLst>
+          </a:blip>
+          <a:stretch>
+            <a:fillRect/>
+          </a:stretch>
+        </p:blipFill>
+        <p:spPr>
+          <a:xfrm>
+            <a:off x="4988742" y="2375759"/>
+            <a:ext cx="5754500" cy="1818836"/>
+          </a:xfrm>
+          <a:prstGeom prst="rect">
+            <a:avLst/>
+          </a:prstGeom>
+        </p:spPr>
+      </p:pic>
+      <p:pic>
+        <p:nvPicPr>
+          <p:cNvPr id="5" name="Picture 4" descr="A network of connected lines and dots&#10;&#10;Description automatically generated">
+            <a:extLst>
+              <a:ext uri="{FF2B5EF4-FFF2-40B4-BE49-F238E27FC236}">
+                <a16:creationId xmlns:a16="http://schemas.microsoft.com/office/drawing/2014/main" id="{66FA149D-5D81-C758-B419-7F728F44A455}"/>
+              </a:ext>
+            </a:extLst>
+          </p:cNvPr>
+          <p:cNvPicPr>
+            <a:picLocks noChangeAspect="1"/>
+          </p:cNvPicPr>
+          <p:nvPr/>
+        </p:nvPicPr>
+        <p:blipFill>
+          <a:blip r:embed="rId3">
+            <a:extLst>
+              <a:ext uri="{28A0092B-C50C-407E-A947-70E740481C1C}">
+                <a14:useLocalDpi xmlns:a14="http://schemas.microsoft.com/office/drawing/2010/main" val="0"/>
+              </a:ext>
+            </a:extLst>
+          </a:blip>
+          <a:stretch>
+            <a:fillRect/>
+          </a:stretch>
+        </p:blipFill>
+        <p:spPr>
+          <a:xfrm>
+            <a:off x="1402294" y="2133600"/>
+            <a:ext cx="3213972" cy="2436018"/>
+          </a:xfrm>
+          <a:prstGeom prst="rect">
+            <a:avLst/>
+          </a:prstGeom>
+        </p:spPr>
+      </p:pic>
+      <p:sp>
+        <p:nvSpPr>
+          <p:cNvPr id="6" name="TextBox 5">
+            <a:extLst>
+              <a:ext uri="{FF2B5EF4-FFF2-40B4-BE49-F238E27FC236}">
+                <a16:creationId xmlns:a16="http://schemas.microsoft.com/office/drawing/2014/main" id="{88804415-5D3D-0B12-9A89-7DF1FAD7564E}"/>
+              </a:ext>
+            </a:extLst>
+          </p:cNvPr>
+          <p:cNvSpPr txBox="1"/>
+          <p:nvPr/>
+        </p:nvSpPr>
+        <p:spPr>
+          <a:xfrm>
+            <a:off x="1889431" y="4730335"/>
+            <a:ext cx="2116324" cy="546560"/>
+          </a:xfrm>
+          <a:prstGeom prst="rect">
+            <a:avLst/>
+          </a:prstGeom>
+          <a:noFill/>
+        </p:spPr>
+        <p:txBody>
+          <a:bodyPr wrap="square" rtlCol="0">
+            <a:spAutoFit/>
+          </a:bodyPr>
+          <a:lstStyle/>
+          <a:p>
+            <a:pPr algn="ctr" defTabSz="749808">
+              <a:spcAft>
+                <a:spcPts val="600"/>
+              </a:spcAft>
+            </a:pPr>
+            <a:r>
+              <a:rPr lang="en-US" sz="1476" kern="1200">
+                <a:solidFill>
+                  <a:schemeClr val="tx1"/>
+                </a:solidFill>
+                <a:latin typeface="+mn-lt"/>
+                <a:ea typeface="+mn-ea"/>
+                <a:cs typeface="+mn-cs"/>
+              </a:rPr>
+              <a:t>Underlying Transition Structure</a:t>
+            </a:r>
+            <a:endParaRPr lang="en-US"/>
+          </a:p>
+        </p:txBody>
+      </p:sp>
+      <p:sp>
+        <p:nvSpPr>
+          <p:cNvPr id="7" name="TextBox 6">
+            <a:extLst>
+              <a:ext uri="{FF2B5EF4-FFF2-40B4-BE49-F238E27FC236}">
+                <a16:creationId xmlns:a16="http://schemas.microsoft.com/office/drawing/2014/main" id="{A28C0152-A048-BD78-5810-9AE6194B866E}"/>
+              </a:ext>
+            </a:extLst>
+          </p:cNvPr>
+          <p:cNvSpPr txBox="1"/>
+          <p:nvPr/>
+        </p:nvSpPr>
+        <p:spPr>
+          <a:xfrm>
+            <a:off x="5279820" y="4730335"/>
+            <a:ext cx="2116324" cy="773673"/>
+          </a:xfrm>
+          <a:prstGeom prst="rect">
+            <a:avLst/>
+          </a:prstGeom>
+          <a:noFill/>
+        </p:spPr>
+        <p:txBody>
+          <a:bodyPr wrap="square" rtlCol="0">
+            <a:spAutoFit/>
+          </a:bodyPr>
+          <a:lstStyle/>
+          <a:p>
+            <a:pPr algn="ctr" defTabSz="749808">
+              <a:spcAft>
+                <a:spcPts val="600"/>
+              </a:spcAft>
+            </a:pPr>
+            <a:r>
+              <a:rPr lang="en-US" sz="1476" kern="1200">
+                <a:solidFill>
+                  <a:schemeClr val="tx1"/>
+                </a:solidFill>
+                <a:latin typeface="+mn-lt"/>
+                <a:ea typeface="+mn-ea"/>
+                <a:cs typeface="+mn-cs"/>
+              </a:rPr>
+              <a:t>Randomly assigned node-to-arrangement stimuli.</a:t>
+            </a:r>
+            <a:endParaRPr lang="en-US"/>
+          </a:p>
+        </p:txBody>
+      </p:sp>
+      <p:sp>
+        <p:nvSpPr>
+          <p:cNvPr id="8" name="TextBox 7">
+            <a:extLst>
+              <a:ext uri="{FF2B5EF4-FFF2-40B4-BE49-F238E27FC236}">
+                <a16:creationId xmlns:a16="http://schemas.microsoft.com/office/drawing/2014/main" id="{0B74355D-619A-B63C-3E5A-31DB7B9EAAEF}"/>
+              </a:ext>
+            </a:extLst>
+          </p:cNvPr>
+          <p:cNvSpPr txBox="1"/>
+          <p:nvPr/>
+        </p:nvSpPr>
+        <p:spPr>
+          <a:xfrm>
+            <a:off x="8670208" y="4844611"/>
+            <a:ext cx="2116324" cy="319446"/>
+          </a:xfrm>
+          <a:prstGeom prst="rect">
+            <a:avLst/>
+          </a:prstGeom>
+          <a:noFill/>
+        </p:spPr>
+        <p:txBody>
+          <a:bodyPr wrap="square" rtlCol="0">
+            <a:spAutoFit/>
+          </a:bodyPr>
+          <a:lstStyle/>
+          <a:p>
+            <a:pPr algn="ctr" defTabSz="749808">
+              <a:spcAft>
+                <a:spcPts val="600"/>
+              </a:spcAft>
+            </a:pPr>
+            <a:r>
+              <a:rPr lang="en-US" sz="1476" kern="1200">
+                <a:solidFill>
+                  <a:schemeClr val="tx1"/>
+                </a:solidFill>
+                <a:latin typeface="+mn-lt"/>
+                <a:ea typeface="+mn-ea"/>
+                <a:cs typeface="+mn-cs"/>
+              </a:rPr>
+              <a:t>Keypress Response</a:t>
+            </a:r>
+            <a:endParaRPr lang="en-US"/>
+          </a:p>
+        </p:txBody>
+      </p:sp>
+    </p:spTree>
+    <p:extLst>
+      <p:ext uri="{BB962C8B-B14F-4D97-AF65-F5344CB8AC3E}">
+        <p14:creationId xmlns:p14="http://schemas.microsoft.com/office/powerpoint/2010/main" val="2730617534"/>
+      </p:ext>
+    </p:extLst>
+  </p:cSld>
+  <p:clrMapOvr>
+    <a:masterClrMapping/>
+  </p:clrMapOvr>
+  <p:timing>
+    <p:tnLst>
+      <p:par>
+        <p:cTn id="1" dur="indefinite" restart="never" nodeType="tmRoot">
+          <p:childTnLst>
+            <p:seq concurrent="1" nextAc="seek">
+              <p:cTn id="2" dur="indefinite" nodeType="mainSeq">
+                <p:childTnLst>
+                  <p:par>
+                    <p:cTn id="3" fill="hold">
+                      <p:stCondLst>
+                        <p:cond delay="indefinite"/>
+                      </p:stCondLst>
+                      <p:childTnLst>
+                        <p:par>
+                          <p:cTn id="4" fill="hold">
+                            <p:stCondLst>
+                              <p:cond delay="0"/>
+                            </p:stCondLst>
+                            <p:childTnLst>
+                              <p:par>
+                                <p:cTn id="5" presetID="1" presetClass="entr" presetSubtype="0" fill="hold" nodeType="clickEffect">
+                                  <p:stCondLst>
+                                    <p:cond delay="0"/>
+                                  </p:stCondLst>
+                                  <p:childTnLst>
+                                    <p:set>
+                                      <p:cBhvr>
+                                        <p:cTn id="6" dur="1" fill="hold">
+                                          <p:stCondLst>
+                                            <p:cond delay="0"/>
+                                          </p:stCondLst>
+                                        </p:cTn>
+                                        <p:tgtEl>
+                                          <p:spTgt spid="5"/>
+                                        </p:tgtEl>
+                                        <p:attrNameLst>
+                                          <p:attrName>style.visibility</p:attrName>
+                                        </p:attrNameLst>
+                                      </p:cBhvr>
+                                      <p:to>
+                                        <p:strVal val="visible"/>
+                                      </p:to>
+                                    </p:set>
+                                  </p:childTnLst>
+                                </p:cTn>
+                              </p:par>
+                              <p:par>
+                                <p:cTn id="7" presetID="1" presetClass="entr" presetSubtype="0" fill="hold" grpId="0" nodeType="withEffect">
+                                  <p:stCondLst>
+                                    <p:cond delay="0"/>
+                                  </p:stCondLst>
+                                  <p:childTnLst>
+                                    <p:set>
+                                      <p:cBhvr>
+                                        <p:cTn id="8" dur="1" fill="hold">
+                                          <p:stCondLst>
+                                            <p:cond delay="0"/>
+                                          </p:stCondLst>
+                                        </p:cTn>
+                                        <p:tgtEl>
+                                          <p:spTgt spid="6"/>
+                                        </p:tgtEl>
+                                        <p:attrNameLst>
+                                          <p:attrName>style.visibility</p:attrName>
+                                        </p:attrNameLst>
+                                      </p:cBhvr>
+                                      <p:to>
+                                        <p:strVal val="visible"/>
+                                      </p:to>
+                                    </p:set>
+                                  </p:childTnLst>
+                                </p:cTn>
+                              </p:par>
+                            </p:childTnLst>
+                          </p:cTn>
+                        </p:par>
+                      </p:childTnLst>
+                    </p:cTn>
+                  </p:par>
+                  <p:par>
+                    <p:cTn id="9" fill="hold">
+                      <p:stCondLst>
+                        <p:cond delay="indefinite"/>
+                      </p:stCondLst>
+                      <p:childTnLst>
+                        <p:par>
+                          <p:cTn id="10" fill="hold">
+                            <p:stCondLst>
+                              <p:cond delay="0"/>
+                            </p:stCondLst>
+                            <p:childTnLst>
+                              <p:par>
+                                <p:cTn id="11" presetID="1" presetClass="entr" presetSubtype="0" fill="hold" nodeType="clickEffect">
+                                  <p:stCondLst>
+                                    <p:cond delay="0"/>
+                                  </p:stCondLst>
+                                  <p:childTnLst>
+                                    <p:set>
+                                      <p:cBhvr>
+                                        <p:cTn id="12" dur="1" fill="hold">
+                                          <p:stCondLst>
+                                            <p:cond delay="0"/>
+                                          </p:stCondLst>
+                                        </p:cTn>
+                                        <p:tgtEl>
+                                          <p:spTgt spid="4"/>
+                                        </p:tgtEl>
+                                        <p:attrNameLst>
+                                          <p:attrName>style.visibility</p:attrName>
+                                        </p:attrNameLst>
+                                      </p:cBhvr>
+                                      <p:to>
+                                        <p:strVal val="visible"/>
+                                      </p:to>
+                                    </p:set>
+                                  </p:childTnLst>
+                                </p:cTn>
+                              </p:par>
+                              <p:par>
+                                <p:cTn id="13" presetID="1" presetClass="entr" presetSubtype="0" fill="hold" grpId="0" nodeType="withEffect">
+                                  <p:stCondLst>
+                                    <p:cond delay="0"/>
+                                  </p:stCondLst>
+                                  <p:childTnLst>
+                                    <p:set>
+                                      <p:cBhvr>
+                                        <p:cTn id="14" dur="1" fill="hold">
+                                          <p:stCondLst>
+                                            <p:cond delay="0"/>
+                                          </p:stCondLst>
+                                        </p:cTn>
+                                        <p:tgtEl>
+                                          <p:spTgt spid="7"/>
+                                        </p:tgtEl>
+                                        <p:attrNameLst>
+                                          <p:attrName>style.visibility</p:attrName>
+                                        </p:attrNameLst>
+                                      </p:cBhvr>
+                                      <p:to>
+                                        <p:strVal val="visible"/>
+                                      </p:to>
+                                    </p:set>
+                                  </p:childTnLst>
+                                </p:cTn>
+                              </p:par>
+                              <p:par>
+                                <p:cTn id="15" presetID="1" presetClass="entr" presetSubtype="0" fill="hold" grpId="0" nodeType="withEffect">
+                                  <p:stCondLst>
+                                    <p:cond delay="0"/>
+                                  </p:stCondLst>
+                                  <p:childTnLst>
+                                    <p:set>
+                                      <p:cBhvr>
+                                        <p:cTn id="16" dur="1" fill="hold">
+                                          <p:stCondLst>
+                                            <p:cond delay="0"/>
+                                          </p:stCondLst>
+                                        </p:cTn>
+                                        <p:tgtEl>
+                                          <p:spTgt spid="8"/>
+                                        </p:tgtEl>
+                                        <p:attrNameLst>
+                                          <p:attrName>style.visibility</p:attrName>
+                                        </p:attrNameLst>
+                                      </p:cBhvr>
+                                      <p:to>
+                                        <p:strVal val="visible"/>
+                                      </p:to>
+                                    </p:set>
+                                  </p:childTnLst>
+                                </p:cTn>
+                              </p:par>
+                            </p:childTnLst>
+                          </p:cTn>
+                        </p:par>
+                      </p:childTnLst>
+                    </p:cTn>
+                  </p:par>
+                </p:childTnLst>
+              </p:cTn>
+              <p:prevCondLst>
+                <p:cond evt="onPrev" delay="0">
+                  <p:tgtEl>
+                    <p:sldTgt/>
+                  </p:tgtEl>
+                </p:cond>
+              </p:prevCondLst>
+              <p:nextCondLst>
+                <p:cond evt="onNext" delay="0">
+                  <p:tgtEl>
+                    <p:sldTgt/>
+                  </p:tgtEl>
+                </p:cond>
+              </p:nextCondLst>
+            </p:seq>
+          </p:childTnLst>
+        </p:cTn>
+      </p:par>
+    </p:tnLst>
+    <p:bldLst>
+      <p:bldP spid="6" grpId="0"/>
+      <p:bldP spid="7" grpId="0"/>
+      <p:bldP spid="8" grpId="0"/>
+    </p:bldLst>
+  </p:timing>
+</p:sld>
+</file>
+
+<file path=ppt/slides/slide3.xml><?xml version="1.0" encoding="utf-8"?>
+<p:sld xmlns:a="http://schemas.openxmlformats.org/drawingml/2006/main" xmlns:r="http://schemas.openxmlformats.org/officeDocument/2006/relationships" xmlns:p="http://schemas.openxmlformats.org/presentationml/2006/main">
+  <p:cSld>
+    <p:spTree>
+      <p:nvGrpSpPr>
+        <p:cNvPr id="1" name=""/>
+        <p:cNvGrpSpPr/>
+        <p:nvPr/>
+      </p:nvGrpSpPr>
+      <p:grpSpPr>
+        <a:xfrm>
+          <a:off x="0" y="0"/>
+          <a:ext cx="0" cy="0"/>
+          <a:chOff x="0" y="0"/>
+          <a:chExt cx="0" cy="0"/>
+        </a:xfrm>
+      </p:grpSpPr>
+      <p:pic>
+        <p:nvPicPr>
           <p:cNvPr id="5" name="Picture 4" descr="A diagram of a response function&#10;&#10;Description automatically generated">
             <a:extLst>
               <a:ext uri="{FF2B5EF4-FFF2-40B4-BE49-F238E27FC236}">
@@ -3893,6 +4354,1272 @@
     <p:extLst>
       <p:ext uri="{BB962C8B-B14F-4D97-AF65-F5344CB8AC3E}">
         <p14:creationId xmlns:p14="http://schemas.microsoft.com/office/powerpoint/2010/main" val="731731582"/>
+      </p:ext>
+    </p:extLst>
+  </p:cSld>
+  <p:clrMapOvr>
+    <a:masterClrMapping/>
+  </p:clrMapOvr>
+</p:sld>
+</file>
+
+<file path=ppt/slides/slide4.xml><?xml version="1.0" encoding="utf-8"?>
+<p:sld xmlns:a="http://schemas.openxmlformats.org/drawingml/2006/main" xmlns:r="http://schemas.openxmlformats.org/officeDocument/2006/relationships" xmlns:p="http://schemas.openxmlformats.org/presentationml/2006/main">
+  <p:cSld>
+    <p:spTree>
+      <p:nvGrpSpPr>
+        <p:cNvPr id="1" name=""/>
+        <p:cNvGrpSpPr/>
+        <p:nvPr/>
+      </p:nvGrpSpPr>
+      <p:grpSpPr>
+        <a:xfrm>
+          <a:off x="0" y="0"/>
+          <a:ext cx="0" cy="0"/>
+          <a:chOff x="0" y="0"/>
+          <a:chExt cx="0" cy="0"/>
+        </a:xfrm>
+      </p:grpSpPr>
+      <p:pic>
+        <p:nvPicPr>
+          <p:cNvPr id="7" name="Picture 6" descr="A grey triangle with a black background&#10;&#10;Description automatically generated">
+            <a:extLst>
+              <a:ext uri="{FF2B5EF4-FFF2-40B4-BE49-F238E27FC236}">
+                <a16:creationId xmlns:a16="http://schemas.microsoft.com/office/drawing/2014/main" id="{8DEA5D81-6AF0-2451-3DB3-91092B89C6E9}"/>
+              </a:ext>
+            </a:extLst>
+          </p:cNvPr>
+          <p:cNvPicPr>
+            <a:picLocks noChangeAspect="1"/>
+          </p:cNvPicPr>
+          <p:nvPr/>
+        </p:nvPicPr>
+        <p:blipFill>
+          <a:blip r:embed="rId2">
+            <a:extLst>
+              <a:ext uri="{28A0092B-C50C-407E-A947-70E740481C1C}">
+                <a14:useLocalDpi xmlns:a14="http://schemas.microsoft.com/office/drawing/2010/main" val="0"/>
+              </a:ext>
+            </a:extLst>
+          </a:blip>
+          <a:stretch>
+            <a:fillRect/>
+          </a:stretch>
+        </p:blipFill>
+        <p:spPr>
+          <a:xfrm>
+            <a:off x="1557625" y="2422289"/>
+            <a:ext cx="2194137" cy="1645603"/>
+          </a:xfrm>
+          <a:prstGeom prst="rect">
+            <a:avLst/>
+          </a:prstGeom>
+        </p:spPr>
+      </p:pic>
+      <p:sp>
+        <p:nvSpPr>
+          <p:cNvPr id="8" name="Rectangle 7">
+            <a:extLst>
+              <a:ext uri="{FF2B5EF4-FFF2-40B4-BE49-F238E27FC236}">
+                <a16:creationId xmlns:a16="http://schemas.microsoft.com/office/drawing/2014/main" id="{40D4FA39-5D4B-26FE-ACFC-2A81993ECD43}"/>
+              </a:ext>
+            </a:extLst>
+          </p:cNvPr>
+          <p:cNvSpPr/>
+          <p:nvPr/>
+        </p:nvSpPr>
+        <p:spPr>
+          <a:xfrm>
+            <a:off x="1667449" y="2469301"/>
+            <a:ext cx="2067060" cy="1545465"/>
+          </a:xfrm>
+          <a:prstGeom prst="rect">
+            <a:avLst/>
+          </a:prstGeom>
+          <a:noFill/>
+          <a:ln>
+            <a:solidFill>
+              <a:schemeClr val="accent2"/>
+            </a:solidFill>
+          </a:ln>
+        </p:spPr>
+        <p:style>
+          <a:lnRef idx="2">
+            <a:schemeClr val="accent1">
+              <a:shade val="15000"/>
+            </a:schemeClr>
+          </a:lnRef>
+          <a:fillRef idx="1">
+            <a:schemeClr val="accent1"/>
+          </a:fillRef>
+          <a:effectRef idx="0">
+            <a:schemeClr val="accent1"/>
+          </a:effectRef>
+          <a:fontRef idx="minor">
+            <a:schemeClr val="lt1"/>
+          </a:fontRef>
+        </p:style>
+        <p:txBody>
+          <a:bodyPr rtlCol="0" anchor="ctr"/>
+          <a:lstStyle/>
+          <a:p>
+            <a:pPr algn="ctr"/>
+            <a:endParaRPr lang="en-US"/>
+          </a:p>
+        </p:txBody>
+      </p:sp>
+      <p:sp>
+        <p:nvSpPr>
+          <p:cNvPr id="9" name="TextBox 8">
+            <a:extLst>
+              <a:ext uri="{FF2B5EF4-FFF2-40B4-BE49-F238E27FC236}">
+                <a16:creationId xmlns:a16="http://schemas.microsoft.com/office/drawing/2014/main" id="{52247EB9-FBB5-0555-074E-B83550791239}"/>
+              </a:ext>
+            </a:extLst>
+          </p:cNvPr>
+          <p:cNvSpPr txBox="1"/>
+          <p:nvPr/>
+        </p:nvSpPr>
+        <p:spPr>
+          <a:xfrm>
+            <a:off x="1245347" y="1722832"/>
+            <a:ext cx="2818691" cy="523220"/>
+          </a:xfrm>
+          <a:prstGeom prst="rect">
+            <a:avLst/>
+          </a:prstGeom>
+          <a:noFill/>
+        </p:spPr>
+        <p:txBody>
+          <a:bodyPr wrap="square" rtlCol="0">
+            <a:spAutoFit/>
+          </a:bodyPr>
+          <a:lstStyle/>
+          <a:p>
+            <a:pPr algn="ctr"/>
+            <a:r>
+              <a:rPr lang="en-US" sz="1400" dirty="0"/>
+              <a:t>Exposure </a:t>
+            </a:r>
+          </a:p>
+          <a:p>
+            <a:pPr algn="ctr"/>
+            <a:r>
+              <a:rPr lang="en-US" sz="1400" dirty="0"/>
+              <a:t>Is this item rotated?</a:t>
+            </a:r>
+          </a:p>
+        </p:txBody>
+      </p:sp>
+      <p:pic>
+        <p:nvPicPr>
+          <p:cNvPr id="10" name="Picture 9" descr="A grey triangle with a black background&#10;&#10;Description automatically generated">
+            <a:extLst>
+              <a:ext uri="{FF2B5EF4-FFF2-40B4-BE49-F238E27FC236}">
+                <a16:creationId xmlns:a16="http://schemas.microsoft.com/office/drawing/2014/main" id="{C7930837-2767-6AE4-E063-8CF963F8FDBE}"/>
+              </a:ext>
+            </a:extLst>
+          </p:cNvPr>
+          <p:cNvPicPr>
+            <a:picLocks noChangeAspect="1"/>
+          </p:cNvPicPr>
+          <p:nvPr/>
+        </p:nvPicPr>
+        <p:blipFill>
+          <a:blip r:embed="rId2">
+            <a:extLst>
+              <a:ext uri="{28A0092B-C50C-407E-A947-70E740481C1C}">
+                <a14:useLocalDpi xmlns:a14="http://schemas.microsoft.com/office/drawing/2010/main" val="0"/>
+              </a:ext>
+            </a:extLst>
+          </a:blip>
+          <a:stretch>
+            <a:fillRect/>
+          </a:stretch>
+        </p:blipFill>
+        <p:spPr>
+          <a:xfrm>
+            <a:off x="5617157" y="2419231"/>
+            <a:ext cx="2194137" cy="1645603"/>
+          </a:xfrm>
+          <a:prstGeom prst="rect">
+            <a:avLst/>
+          </a:prstGeom>
+        </p:spPr>
+      </p:pic>
+      <p:sp>
+        <p:nvSpPr>
+          <p:cNvPr id="11" name="TextBox 10">
+            <a:extLst>
+              <a:ext uri="{FF2B5EF4-FFF2-40B4-BE49-F238E27FC236}">
+                <a16:creationId xmlns:a16="http://schemas.microsoft.com/office/drawing/2014/main" id="{9B6DF95C-0554-0C24-017C-A65E1B8E6466}"/>
+              </a:ext>
+            </a:extLst>
+          </p:cNvPr>
+          <p:cNvSpPr txBox="1"/>
+          <p:nvPr/>
+        </p:nvSpPr>
+        <p:spPr>
+          <a:xfrm>
+            <a:off x="4468482" y="1722832"/>
+            <a:ext cx="4491488" cy="738664"/>
+          </a:xfrm>
+          <a:prstGeom prst="rect">
+            <a:avLst/>
+          </a:prstGeom>
+          <a:noFill/>
+        </p:spPr>
+        <p:txBody>
+          <a:bodyPr wrap="square" rtlCol="0">
+            <a:spAutoFit/>
+          </a:bodyPr>
+          <a:lstStyle/>
+          <a:p>
+            <a:pPr algn="ctr"/>
+            <a:r>
+              <a:rPr lang="en-US" sz="1400" dirty="0"/>
+              <a:t>Recognition Test</a:t>
+            </a:r>
+          </a:p>
+          <a:p>
+            <a:pPr algn="ctr"/>
+            <a:r>
+              <a:rPr lang="en-US" sz="1400" dirty="0"/>
+              <a:t>Was this an old item (one of the items you had seen before) or a new item (an item you haven't seen before)?</a:t>
+            </a:r>
+          </a:p>
+        </p:txBody>
+      </p:sp>
+      <p:sp>
+        <p:nvSpPr>
+          <p:cNvPr id="13" name="TextBox 12">
+            <a:extLst>
+              <a:ext uri="{FF2B5EF4-FFF2-40B4-BE49-F238E27FC236}">
+                <a16:creationId xmlns:a16="http://schemas.microsoft.com/office/drawing/2014/main" id="{AE6B401D-B0BC-BD08-22AC-419348A7AE90}"/>
+              </a:ext>
+            </a:extLst>
+          </p:cNvPr>
+          <p:cNvSpPr txBox="1"/>
+          <p:nvPr/>
+        </p:nvSpPr>
+        <p:spPr>
+          <a:xfrm>
+            <a:off x="2110596" y="4183913"/>
+            <a:ext cx="1184693" cy="307777"/>
+          </a:xfrm>
+          <a:prstGeom prst="rect">
+            <a:avLst/>
+          </a:prstGeom>
+          <a:noFill/>
+        </p:spPr>
+        <p:txBody>
+          <a:bodyPr wrap="square">
+            <a:spAutoFit/>
+          </a:bodyPr>
+          <a:lstStyle/>
+          <a:p>
+            <a:pPr algn="ctr"/>
+            <a:r>
+              <a:rPr lang="en-US" sz="1400" dirty="0"/>
+              <a:t>250 Trials</a:t>
+            </a:r>
+          </a:p>
+        </p:txBody>
+      </p:sp>
+      <p:sp>
+        <p:nvSpPr>
+          <p:cNvPr id="14" name="TextBox 13">
+            <a:extLst>
+              <a:ext uri="{FF2B5EF4-FFF2-40B4-BE49-F238E27FC236}">
+                <a16:creationId xmlns:a16="http://schemas.microsoft.com/office/drawing/2014/main" id="{BF46EF3C-A95F-E6F6-DC04-42F815CC101A}"/>
+              </a:ext>
+            </a:extLst>
+          </p:cNvPr>
+          <p:cNvSpPr txBox="1"/>
+          <p:nvPr/>
+        </p:nvSpPr>
+        <p:spPr>
+          <a:xfrm>
+            <a:off x="6105987" y="4183913"/>
+            <a:ext cx="1607390" cy="307777"/>
+          </a:xfrm>
+          <a:prstGeom prst="rect">
+            <a:avLst/>
+          </a:prstGeom>
+          <a:noFill/>
+        </p:spPr>
+        <p:txBody>
+          <a:bodyPr wrap="square">
+            <a:spAutoFit/>
+          </a:bodyPr>
+          <a:lstStyle/>
+          <a:p>
+            <a:pPr algn="ctr"/>
+            <a:r>
+              <a:rPr lang="en-US" sz="1400" dirty="0"/>
+              <a:t>30 trials, 15 old</a:t>
+            </a:r>
+          </a:p>
+        </p:txBody>
+      </p:sp>
+    </p:spTree>
+    <p:extLst>
+      <p:ext uri="{BB962C8B-B14F-4D97-AF65-F5344CB8AC3E}">
+        <p14:creationId xmlns:p14="http://schemas.microsoft.com/office/powerpoint/2010/main" val="2846061621"/>
+      </p:ext>
+    </p:extLst>
+  </p:cSld>
+  <p:clrMapOvr>
+    <a:masterClrMapping/>
+  </p:clrMapOvr>
+</p:sld>
+</file>
+
+<file path=ppt/slides/slide5.xml><?xml version="1.0" encoding="utf-8"?>
+<p:sld xmlns:a="http://schemas.openxmlformats.org/drawingml/2006/main" xmlns:r="http://schemas.openxmlformats.org/officeDocument/2006/relationships" xmlns:p="http://schemas.openxmlformats.org/presentationml/2006/main">
+  <p:cSld>
+    <p:spTree>
+      <p:nvGrpSpPr>
+        <p:cNvPr id="1" name=""/>
+        <p:cNvGrpSpPr/>
+        <p:nvPr/>
+      </p:nvGrpSpPr>
+      <p:grpSpPr>
+        <a:xfrm>
+          <a:off x="0" y="0"/>
+          <a:ext cx="0" cy="0"/>
+          <a:chOff x="0" y="0"/>
+          <a:chExt cx="0" cy="0"/>
+        </a:xfrm>
+      </p:grpSpPr>
+      <p:pic>
+        <p:nvPicPr>
+          <p:cNvPr id="9" name="Picture 8" descr="A screenshot of a graph&#10;&#10;Description automatically generated">
+            <a:extLst>
+              <a:ext uri="{FF2B5EF4-FFF2-40B4-BE49-F238E27FC236}">
+                <a16:creationId xmlns:a16="http://schemas.microsoft.com/office/drawing/2014/main" id="{2B4AD5F6-9FB3-37C3-CAEE-D6E8E14D2B75}"/>
+              </a:ext>
+            </a:extLst>
+          </p:cNvPr>
+          <p:cNvPicPr>
+            <a:picLocks noChangeAspect="1"/>
+          </p:cNvPicPr>
+          <p:nvPr/>
+        </p:nvPicPr>
+        <p:blipFill>
+          <a:blip r:embed="rId2">
+            <a:extLst>
+              <a:ext uri="{28A0092B-C50C-407E-A947-70E740481C1C}">
+                <a14:useLocalDpi xmlns:a14="http://schemas.microsoft.com/office/drawing/2010/main" val="0"/>
+              </a:ext>
+            </a:extLst>
+          </a:blip>
+          <a:stretch>
+            <a:fillRect/>
+          </a:stretch>
+        </p:blipFill>
+        <p:spPr>
+          <a:xfrm>
+            <a:off x="5851302" y="605307"/>
+            <a:ext cx="5834130" cy="5834130"/>
+          </a:xfrm>
+          <a:prstGeom prst="rect">
+            <a:avLst/>
+          </a:prstGeom>
+        </p:spPr>
+      </p:pic>
+      <p:pic>
+        <p:nvPicPr>
+          <p:cNvPr id="11" name="Picture 10" descr="A screenshot of a graph&#10;&#10;Description automatically generated">
+            <a:extLst>
+              <a:ext uri="{FF2B5EF4-FFF2-40B4-BE49-F238E27FC236}">
+                <a16:creationId xmlns:a16="http://schemas.microsoft.com/office/drawing/2014/main" id="{81542607-0DE0-B14F-3A03-2D70C65C388D}"/>
+              </a:ext>
+            </a:extLst>
+          </p:cNvPr>
+          <p:cNvPicPr>
+            <a:picLocks noChangeAspect="1"/>
+          </p:cNvPicPr>
+          <p:nvPr/>
+        </p:nvPicPr>
+        <p:blipFill>
+          <a:blip r:embed="rId3">
+            <a:extLst>
+              <a:ext uri="{28A0092B-C50C-407E-A947-70E740481C1C}">
+                <a14:useLocalDpi xmlns:a14="http://schemas.microsoft.com/office/drawing/2010/main" val="0"/>
+              </a:ext>
+            </a:extLst>
+          </a:blip>
+          <a:stretch>
+            <a:fillRect/>
+          </a:stretch>
+        </p:blipFill>
+        <p:spPr>
+          <a:xfrm>
+            <a:off x="880057" y="605307"/>
+            <a:ext cx="5834130" cy="5834130"/>
+          </a:xfrm>
+          <a:prstGeom prst="rect">
+            <a:avLst/>
+          </a:prstGeom>
+        </p:spPr>
+      </p:pic>
+      <p:sp>
+        <p:nvSpPr>
+          <p:cNvPr id="12" name="TextBox 11">
+            <a:extLst>
+              <a:ext uri="{FF2B5EF4-FFF2-40B4-BE49-F238E27FC236}">
+                <a16:creationId xmlns:a16="http://schemas.microsoft.com/office/drawing/2014/main" id="{3B5A3307-CA2E-33DE-FCDB-E798E19FCBD2}"/>
+              </a:ext>
+            </a:extLst>
+          </p:cNvPr>
+          <p:cNvSpPr txBox="1"/>
+          <p:nvPr/>
+        </p:nvSpPr>
+        <p:spPr>
+          <a:xfrm>
+            <a:off x="6851556" y="2285999"/>
+            <a:ext cx="1354999" cy="276999"/>
+          </a:xfrm>
+          <a:prstGeom prst="rect">
+            <a:avLst/>
+          </a:prstGeom>
+          <a:noFill/>
+        </p:spPr>
+        <p:txBody>
+          <a:bodyPr wrap="square" rtlCol="0">
+            <a:spAutoFit/>
+          </a:bodyPr>
+          <a:lstStyle/>
+          <a:p>
+            <a:r>
+              <a:rPr lang="en-US" sz="1200" dirty="0" err="1"/>
+              <a:t>Nonboundary</a:t>
+            </a:r>
+            <a:endParaRPr lang="en-US" sz="1200" dirty="0"/>
+          </a:p>
+        </p:txBody>
+      </p:sp>
+      <p:sp>
+        <p:nvSpPr>
+          <p:cNvPr id="13" name="TextBox 12">
+            <a:extLst>
+              <a:ext uri="{FF2B5EF4-FFF2-40B4-BE49-F238E27FC236}">
+                <a16:creationId xmlns:a16="http://schemas.microsoft.com/office/drawing/2014/main" id="{B04CB8EF-9F9F-AC7F-E18F-DA9AD20F5B3B}"/>
+              </a:ext>
+            </a:extLst>
+          </p:cNvPr>
+          <p:cNvSpPr txBox="1"/>
+          <p:nvPr/>
+        </p:nvSpPr>
+        <p:spPr>
+          <a:xfrm>
+            <a:off x="8087928" y="2285998"/>
+            <a:ext cx="1354999" cy="276999"/>
+          </a:xfrm>
+          <a:prstGeom prst="rect">
+            <a:avLst/>
+          </a:prstGeom>
+          <a:noFill/>
+        </p:spPr>
+        <p:txBody>
+          <a:bodyPr wrap="square" rtlCol="0">
+            <a:spAutoFit/>
+          </a:bodyPr>
+          <a:lstStyle/>
+          <a:p>
+            <a:r>
+              <a:rPr lang="en-US" sz="1200" dirty="0"/>
+              <a:t>Boundary</a:t>
+            </a:r>
+          </a:p>
+        </p:txBody>
+      </p:sp>
+      <p:sp>
+        <p:nvSpPr>
+          <p:cNvPr id="14" name="TextBox 13">
+            <a:extLst>
+              <a:ext uri="{FF2B5EF4-FFF2-40B4-BE49-F238E27FC236}">
+                <a16:creationId xmlns:a16="http://schemas.microsoft.com/office/drawing/2014/main" id="{BC5F6A27-ACAD-F1A9-7137-A019289C3100}"/>
+              </a:ext>
+            </a:extLst>
+          </p:cNvPr>
+          <p:cNvSpPr txBox="1"/>
+          <p:nvPr/>
+        </p:nvSpPr>
+        <p:spPr>
+          <a:xfrm>
+            <a:off x="9245950" y="2285997"/>
+            <a:ext cx="1354999" cy="276999"/>
+          </a:xfrm>
+          <a:prstGeom prst="rect">
+            <a:avLst/>
+          </a:prstGeom>
+          <a:noFill/>
+        </p:spPr>
+        <p:txBody>
+          <a:bodyPr wrap="square" rtlCol="0">
+            <a:spAutoFit/>
+          </a:bodyPr>
+          <a:lstStyle/>
+          <a:p>
+            <a:r>
+              <a:rPr lang="en-US" sz="1200" dirty="0"/>
+              <a:t>New</a:t>
+            </a:r>
+          </a:p>
+        </p:txBody>
+      </p:sp>
+      <p:sp>
+        <p:nvSpPr>
+          <p:cNvPr id="15" name="TextBox 14">
+            <a:extLst>
+              <a:ext uri="{FF2B5EF4-FFF2-40B4-BE49-F238E27FC236}">
+                <a16:creationId xmlns:a16="http://schemas.microsoft.com/office/drawing/2014/main" id="{A89DBC8A-03BE-3D6D-9849-792B00443441}"/>
+              </a:ext>
+            </a:extLst>
+          </p:cNvPr>
+          <p:cNvSpPr txBox="1"/>
+          <p:nvPr/>
+        </p:nvSpPr>
+        <p:spPr>
+          <a:xfrm>
+            <a:off x="6851556" y="3953758"/>
+            <a:ext cx="1354999" cy="276999"/>
+          </a:xfrm>
+          <a:prstGeom prst="rect">
+            <a:avLst/>
+          </a:prstGeom>
+          <a:noFill/>
+        </p:spPr>
+        <p:txBody>
+          <a:bodyPr wrap="square" rtlCol="0">
+            <a:spAutoFit/>
+          </a:bodyPr>
+          <a:lstStyle/>
+          <a:p>
+            <a:r>
+              <a:rPr lang="en-US" sz="1200" dirty="0" err="1"/>
+              <a:t>Nonboundary</a:t>
+            </a:r>
+            <a:endParaRPr lang="en-US" sz="1200" dirty="0"/>
+          </a:p>
+        </p:txBody>
+      </p:sp>
+      <p:sp>
+        <p:nvSpPr>
+          <p:cNvPr id="16" name="TextBox 15">
+            <a:extLst>
+              <a:ext uri="{FF2B5EF4-FFF2-40B4-BE49-F238E27FC236}">
+                <a16:creationId xmlns:a16="http://schemas.microsoft.com/office/drawing/2014/main" id="{529C4305-A6F7-8908-0ED4-1A78C4ADAC00}"/>
+              </a:ext>
+            </a:extLst>
+          </p:cNvPr>
+          <p:cNvSpPr txBox="1"/>
+          <p:nvPr/>
+        </p:nvSpPr>
+        <p:spPr>
+          <a:xfrm>
+            <a:off x="8087928" y="3953757"/>
+            <a:ext cx="1354999" cy="276999"/>
+          </a:xfrm>
+          <a:prstGeom prst="rect">
+            <a:avLst/>
+          </a:prstGeom>
+          <a:noFill/>
+        </p:spPr>
+        <p:txBody>
+          <a:bodyPr wrap="square" rtlCol="0">
+            <a:spAutoFit/>
+          </a:bodyPr>
+          <a:lstStyle/>
+          <a:p>
+            <a:r>
+              <a:rPr lang="en-US" sz="1200" dirty="0"/>
+              <a:t>Boundary</a:t>
+            </a:r>
+          </a:p>
+        </p:txBody>
+      </p:sp>
+      <p:sp>
+        <p:nvSpPr>
+          <p:cNvPr id="17" name="TextBox 16">
+            <a:extLst>
+              <a:ext uri="{FF2B5EF4-FFF2-40B4-BE49-F238E27FC236}">
+                <a16:creationId xmlns:a16="http://schemas.microsoft.com/office/drawing/2014/main" id="{4A600363-BA7C-C0F0-A776-841588A3676B}"/>
+              </a:ext>
+            </a:extLst>
+          </p:cNvPr>
+          <p:cNvSpPr txBox="1"/>
+          <p:nvPr/>
+        </p:nvSpPr>
+        <p:spPr>
+          <a:xfrm>
+            <a:off x="9245950" y="3953756"/>
+            <a:ext cx="1354999" cy="276999"/>
+          </a:xfrm>
+          <a:prstGeom prst="rect">
+            <a:avLst/>
+          </a:prstGeom>
+          <a:noFill/>
+        </p:spPr>
+        <p:txBody>
+          <a:bodyPr wrap="square" rtlCol="0">
+            <a:spAutoFit/>
+          </a:bodyPr>
+          <a:lstStyle/>
+          <a:p>
+            <a:r>
+              <a:rPr lang="en-US" sz="1200" dirty="0"/>
+              <a:t>New</a:t>
+            </a:r>
+          </a:p>
+        </p:txBody>
+      </p:sp>
+      <p:sp>
+        <p:nvSpPr>
+          <p:cNvPr id="18" name="TextBox 17">
+            <a:extLst>
+              <a:ext uri="{FF2B5EF4-FFF2-40B4-BE49-F238E27FC236}">
+                <a16:creationId xmlns:a16="http://schemas.microsoft.com/office/drawing/2014/main" id="{781542F5-773F-A7E0-4752-6C675A1B2332}"/>
+              </a:ext>
+            </a:extLst>
+          </p:cNvPr>
+          <p:cNvSpPr txBox="1"/>
+          <p:nvPr/>
+        </p:nvSpPr>
+        <p:spPr>
+          <a:xfrm>
+            <a:off x="6909511" y="5760061"/>
+            <a:ext cx="1354999" cy="276999"/>
+          </a:xfrm>
+          <a:prstGeom prst="rect">
+            <a:avLst/>
+          </a:prstGeom>
+          <a:noFill/>
+        </p:spPr>
+        <p:txBody>
+          <a:bodyPr wrap="square" rtlCol="0">
+            <a:spAutoFit/>
+          </a:bodyPr>
+          <a:lstStyle/>
+          <a:p>
+            <a:r>
+              <a:rPr lang="en-US" sz="1200" dirty="0" err="1"/>
+              <a:t>Nonboundary</a:t>
+            </a:r>
+            <a:endParaRPr lang="en-US" sz="1200" dirty="0"/>
+          </a:p>
+        </p:txBody>
+      </p:sp>
+      <p:sp>
+        <p:nvSpPr>
+          <p:cNvPr id="19" name="TextBox 18">
+            <a:extLst>
+              <a:ext uri="{FF2B5EF4-FFF2-40B4-BE49-F238E27FC236}">
+                <a16:creationId xmlns:a16="http://schemas.microsoft.com/office/drawing/2014/main" id="{F1CA9848-7D18-99C8-E396-D0D3EA0CE7B0}"/>
+              </a:ext>
+            </a:extLst>
+          </p:cNvPr>
+          <p:cNvSpPr txBox="1"/>
+          <p:nvPr/>
+        </p:nvSpPr>
+        <p:spPr>
+          <a:xfrm>
+            <a:off x="8145883" y="5760060"/>
+            <a:ext cx="1354999" cy="276999"/>
+          </a:xfrm>
+          <a:prstGeom prst="rect">
+            <a:avLst/>
+          </a:prstGeom>
+          <a:noFill/>
+        </p:spPr>
+        <p:txBody>
+          <a:bodyPr wrap="square" rtlCol="0">
+            <a:spAutoFit/>
+          </a:bodyPr>
+          <a:lstStyle/>
+          <a:p>
+            <a:r>
+              <a:rPr lang="en-US" sz="1200" dirty="0"/>
+              <a:t>Boundary</a:t>
+            </a:r>
+          </a:p>
+        </p:txBody>
+      </p:sp>
+      <p:sp>
+        <p:nvSpPr>
+          <p:cNvPr id="20" name="TextBox 19">
+            <a:extLst>
+              <a:ext uri="{FF2B5EF4-FFF2-40B4-BE49-F238E27FC236}">
+                <a16:creationId xmlns:a16="http://schemas.microsoft.com/office/drawing/2014/main" id="{4C1FD331-D832-037C-8A90-84636B1E87BD}"/>
+              </a:ext>
+            </a:extLst>
+          </p:cNvPr>
+          <p:cNvSpPr txBox="1"/>
+          <p:nvPr/>
+        </p:nvSpPr>
+        <p:spPr>
+          <a:xfrm>
+            <a:off x="9303905" y="5760059"/>
+            <a:ext cx="1354999" cy="276999"/>
+          </a:xfrm>
+          <a:prstGeom prst="rect">
+            <a:avLst/>
+          </a:prstGeom>
+          <a:noFill/>
+        </p:spPr>
+        <p:txBody>
+          <a:bodyPr wrap="square" rtlCol="0">
+            <a:spAutoFit/>
+          </a:bodyPr>
+          <a:lstStyle/>
+          <a:p>
+            <a:r>
+              <a:rPr lang="en-US" sz="1200" dirty="0"/>
+              <a:t>New</a:t>
+            </a:r>
+          </a:p>
+        </p:txBody>
+      </p:sp>
+      <p:sp>
+        <p:nvSpPr>
+          <p:cNvPr id="21" name="TextBox 20">
+            <a:extLst>
+              <a:ext uri="{FF2B5EF4-FFF2-40B4-BE49-F238E27FC236}">
+                <a16:creationId xmlns:a16="http://schemas.microsoft.com/office/drawing/2014/main" id="{60C4652C-1110-C5C5-B23E-F78EB7B15833}"/>
+              </a:ext>
+            </a:extLst>
+          </p:cNvPr>
+          <p:cNvSpPr txBox="1"/>
+          <p:nvPr/>
+        </p:nvSpPr>
+        <p:spPr>
+          <a:xfrm>
+            <a:off x="2398701" y="3657488"/>
+            <a:ext cx="1178417" cy="276999"/>
+          </a:xfrm>
+          <a:prstGeom prst="rect">
+            <a:avLst/>
+          </a:prstGeom>
+          <a:noFill/>
+        </p:spPr>
+        <p:txBody>
+          <a:bodyPr wrap="square" rtlCol="0">
+            <a:spAutoFit/>
+          </a:bodyPr>
+          <a:lstStyle/>
+          <a:p>
+            <a:r>
+              <a:rPr lang="en-US" sz="1200" dirty="0"/>
+              <a:t>Unstructured</a:t>
+            </a:r>
+          </a:p>
+        </p:txBody>
+      </p:sp>
+      <p:sp>
+        <p:nvSpPr>
+          <p:cNvPr id="22" name="TextBox 21">
+            <a:extLst>
+              <a:ext uri="{FF2B5EF4-FFF2-40B4-BE49-F238E27FC236}">
+                <a16:creationId xmlns:a16="http://schemas.microsoft.com/office/drawing/2014/main" id="{51B9F151-DD2B-1DF1-8821-9F31455CAAC4}"/>
+              </a:ext>
+            </a:extLst>
+          </p:cNvPr>
+          <p:cNvSpPr txBox="1"/>
+          <p:nvPr/>
+        </p:nvSpPr>
+        <p:spPr>
+          <a:xfrm>
+            <a:off x="4419606" y="3657489"/>
+            <a:ext cx="1178417" cy="276999"/>
+          </a:xfrm>
+          <a:prstGeom prst="rect">
+            <a:avLst/>
+          </a:prstGeom>
+          <a:noFill/>
+        </p:spPr>
+        <p:txBody>
+          <a:bodyPr wrap="square" rtlCol="0">
+            <a:spAutoFit/>
+          </a:bodyPr>
+          <a:lstStyle/>
+          <a:p>
+            <a:r>
+              <a:rPr lang="en-US" sz="1200" dirty="0"/>
+              <a:t>Structured</a:t>
+            </a:r>
+          </a:p>
+        </p:txBody>
+      </p:sp>
+      <p:sp>
+        <p:nvSpPr>
+          <p:cNvPr id="24" name="TextBox 23">
+            <a:extLst>
+              <a:ext uri="{FF2B5EF4-FFF2-40B4-BE49-F238E27FC236}">
+                <a16:creationId xmlns:a16="http://schemas.microsoft.com/office/drawing/2014/main" id="{EF6B9807-C728-7D18-1745-624A1BAF760B}"/>
+              </a:ext>
+            </a:extLst>
+          </p:cNvPr>
+          <p:cNvSpPr txBox="1"/>
+          <p:nvPr/>
+        </p:nvSpPr>
+        <p:spPr>
+          <a:xfrm>
+            <a:off x="2398701" y="5381111"/>
+            <a:ext cx="1178417" cy="276999"/>
+          </a:xfrm>
+          <a:prstGeom prst="rect">
+            <a:avLst/>
+          </a:prstGeom>
+          <a:noFill/>
+        </p:spPr>
+        <p:txBody>
+          <a:bodyPr wrap="square" rtlCol="0">
+            <a:spAutoFit/>
+          </a:bodyPr>
+          <a:lstStyle/>
+          <a:p>
+            <a:r>
+              <a:rPr lang="en-US" sz="1200" dirty="0"/>
+              <a:t>Unstructured</a:t>
+            </a:r>
+          </a:p>
+        </p:txBody>
+      </p:sp>
+      <p:sp>
+        <p:nvSpPr>
+          <p:cNvPr id="25" name="TextBox 24">
+            <a:extLst>
+              <a:ext uri="{FF2B5EF4-FFF2-40B4-BE49-F238E27FC236}">
+                <a16:creationId xmlns:a16="http://schemas.microsoft.com/office/drawing/2014/main" id="{032B9FCC-20B2-9963-AA3D-6BFA7AEA51D5}"/>
+              </a:ext>
+            </a:extLst>
+          </p:cNvPr>
+          <p:cNvSpPr txBox="1"/>
+          <p:nvPr/>
+        </p:nvSpPr>
+        <p:spPr>
+          <a:xfrm>
+            <a:off x="4419606" y="5381112"/>
+            <a:ext cx="1178417" cy="276999"/>
+          </a:xfrm>
+          <a:prstGeom prst="rect">
+            <a:avLst/>
+          </a:prstGeom>
+          <a:noFill/>
+        </p:spPr>
+        <p:txBody>
+          <a:bodyPr wrap="square" rtlCol="0">
+            <a:spAutoFit/>
+          </a:bodyPr>
+          <a:lstStyle/>
+          <a:p>
+            <a:r>
+              <a:rPr lang="en-US" sz="1200" dirty="0"/>
+              <a:t>Structured</a:t>
+            </a:r>
+          </a:p>
+        </p:txBody>
+      </p:sp>
+      <p:sp>
+        <p:nvSpPr>
+          <p:cNvPr id="26" name="TextBox 25">
+            <a:extLst>
+              <a:ext uri="{FF2B5EF4-FFF2-40B4-BE49-F238E27FC236}">
+                <a16:creationId xmlns:a16="http://schemas.microsoft.com/office/drawing/2014/main" id="{62502D69-B2E1-554B-E543-01B7081FA2A4}"/>
+              </a:ext>
+            </a:extLst>
+          </p:cNvPr>
+          <p:cNvSpPr txBox="1"/>
+          <p:nvPr/>
+        </p:nvSpPr>
+        <p:spPr>
+          <a:xfrm>
+            <a:off x="2398701" y="2008997"/>
+            <a:ext cx="1178417" cy="276999"/>
+          </a:xfrm>
+          <a:prstGeom prst="rect">
+            <a:avLst/>
+          </a:prstGeom>
+          <a:noFill/>
+        </p:spPr>
+        <p:txBody>
+          <a:bodyPr wrap="square" rtlCol="0">
+            <a:spAutoFit/>
+          </a:bodyPr>
+          <a:lstStyle/>
+          <a:p>
+            <a:r>
+              <a:rPr lang="en-US" sz="1200" dirty="0"/>
+              <a:t>Unstructured</a:t>
+            </a:r>
+          </a:p>
+        </p:txBody>
+      </p:sp>
+      <p:sp>
+        <p:nvSpPr>
+          <p:cNvPr id="27" name="TextBox 26">
+            <a:extLst>
+              <a:ext uri="{FF2B5EF4-FFF2-40B4-BE49-F238E27FC236}">
+                <a16:creationId xmlns:a16="http://schemas.microsoft.com/office/drawing/2014/main" id="{30C64220-908F-13E1-A02B-ACC113F2CE14}"/>
+              </a:ext>
+            </a:extLst>
+          </p:cNvPr>
+          <p:cNvSpPr txBox="1"/>
+          <p:nvPr/>
+        </p:nvSpPr>
+        <p:spPr>
+          <a:xfrm>
+            <a:off x="4419606" y="2008998"/>
+            <a:ext cx="1178417" cy="276999"/>
+          </a:xfrm>
+          <a:prstGeom prst="rect">
+            <a:avLst/>
+          </a:prstGeom>
+          <a:noFill/>
+        </p:spPr>
+        <p:txBody>
+          <a:bodyPr wrap="square" rtlCol="0">
+            <a:spAutoFit/>
+          </a:bodyPr>
+          <a:lstStyle/>
+          <a:p>
+            <a:r>
+              <a:rPr lang="en-US" sz="1200" dirty="0"/>
+              <a:t>Structured</a:t>
+            </a:r>
+          </a:p>
+        </p:txBody>
+      </p:sp>
+      <p:sp>
+        <p:nvSpPr>
+          <p:cNvPr id="28" name="Rectangle 27">
+            <a:extLst>
+              <a:ext uri="{FF2B5EF4-FFF2-40B4-BE49-F238E27FC236}">
+                <a16:creationId xmlns:a16="http://schemas.microsoft.com/office/drawing/2014/main" id="{4A1F952E-A8FB-FB53-49F1-DFC04C8121B9}"/>
+              </a:ext>
+            </a:extLst>
+          </p:cNvPr>
+          <p:cNvSpPr/>
+          <p:nvPr/>
+        </p:nvSpPr>
+        <p:spPr>
+          <a:xfrm>
+            <a:off x="1887844" y="1880314"/>
+            <a:ext cx="636416" cy="173865"/>
+          </a:xfrm>
+          <a:prstGeom prst="rect">
+            <a:avLst/>
+          </a:prstGeom>
+          <a:solidFill>
+            <a:schemeClr val="bg1"/>
+          </a:solidFill>
+          <a:ln>
+            <a:solidFill>
+              <a:schemeClr val="bg1"/>
+            </a:solidFill>
+          </a:ln>
+        </p:spPr>
+        <p:style>
+          <a:lnRef idx="2">
+            <a:schemeClr val="accent1">
+              <a:shade val="15000"/>
+            </a:schemeClr>
+          </a:lnRef>
+          <a:fillRef idx="1">
+            <a:schemeClr val="accent1"/>
+          </a:fillRef>
+          <a:effectRef idx="0">
+            <a:schemeClr val="accent1"/>
+          </a:effectRef>
+          <a:fontRef idx="minor">
+            <a:schemeClr val="lt1"/>
+          </a:fontRef>
+        </p:style>
+        <p:txBody>
+          <a:bodyPr rtlCol="0" anchor="ctr"/>
+          <a:lstStyle/>
+          <a:p>
+            <a:pPr algn="ctr"/>
+            <a:endParaRPr lang="en-US"/>
+          </a:p>
+        </p:txBody>
+      </p:sp>
+      <p:sp>
+        <p:nvSpPr>
+          <p:cNvPr id="29" name="Rectangle 28">
+            <a:extLst>
+              <a:ext uri="{FF2B5EF4-FFF2-40B4-BE49-F238E27FC236}">
+                <a16:creationId xmlns:a16="http://schemas.microsoft.com/office/drawing/2014/main" id="{445309A5-21E3-4739-65F8-2E1EF5E79D12}"/>
+              </a:ext>
+            </a:extLst>
+          </p:cNvPr>
+          <p:cNvSpPr/>
+          <p:nvPr/>
+        </p:nvSpPr>
+        <p:spPr>
+          <a:xfrm>
+            <a:off x="1843861" y="3573769"/>
+            <a:ext cx="636416" cy="173865"/>
+          </a:xfrm>
+          <a:prstGeom prst="rect">
+            <a:avLst/>
+          </a:prstGeom>
+          <a:solidFill>
+            <a:schemeClr val="bg1"/>
+          </a:solidFill>
+          <a:ln>
+            <a:solidFill>
+              <a:schemeClr val="bg1"/>
+            </a:solidFill>
+          </a:ln>
+        </p:spPr>
+        <p:style>
+          <a:lnRef idx="2">
+            <a:schemeClr val="accent1">
+              <a:shade val="15000"/>
+            </a:schemeClr>
+          </a:lnRef>
+          <a:fillRef idx="1">
+            <a:schemeClr val="accent1"/>
+          </a:fillRef>
+          <a:effectRef idx="0">
+            <a:schemeClr val="accent1"/>
+          </a:effectRef>
+          <a:fontRef idx="minor">
+            <a:schemeClr val="lt1"/>
+          </a:fontRef>
+        </p:style>
+        <p:txBody>
+          <a:bodyPr rtlCol="0" anchor="ctr"/>
+          <a:lstStyle/>
+          <a:p>
+            <a:pPr algn="ctr"/>
+            <a:endParaRPr lang="en-US"/>
+          </a:p>
+        </p:txBody>
+      </p:sp>
+      <p:sp>
+        <p:nvSpPr>
+          <p:cNvPr id="30" name="Rectangle 29">
+            <a:extLst>
+              <a:ext uri="{FF2B5EF4-FFF2-40B4-BE49-F238E27FC236}">
+                <a16:creationId xmlns:a16="http://schemas.microsoft.com/office/drawing/2014/main" id="{4C69A501-638C-A339-1980-485B6CC336F5}"/>
+              </a:ext>
+            </a:extLst>
+          </p:cNvPr>
+          <p:cNvSpPr/>
+          <p:nvPr/>
+        </p:nvSpPr>
+        <p:spPr>
+          <a:xfrm>
+            <a:off x="1833114" y="5347882"/>
+            <a:ext cx="636416" cy="173865"/>
+          </a:xfrm>
+          <a:prstGeom prst="rect">
+            <a:avLst/>
+          </a:prstGeom>
+          <a:solidFill>
+            <a:schemeClr val="bg1"/>
+          </a:solidFill>
+          <a:ln>
+            <a:solidFill>
+              <a:schemeClr val="bg1"/>
+            </a:solidFill>
+          </a:ln>
+        </p:spPr>
+        <p:style>
+          <a:lnRef idx="2">
+            <a:schemeClr val="accent1">
+              <a:shade val="15000"/>
+            </a:schemeClr>
+          </a:lnRef>
+          <a:fillRef idx="1">
+            <a:schemeClr val="accent1"/>
+          </a:fillRef>
+          <a:effectRef idx="0">
+            <a:schemeClr val="accent1"/>
+          </a:effectRef>
+          <a:fontRef idx="minor">
+            <a:schemeClr val="lt1"/>
+          </a:fontRef>
+        </p:style>
+        <p:txBody>
+          <a:bodyPr rtlCol="0" anchor="ctr"/>
+          <a:lstStyle/>
+          <a:p>
+            <a:pPr algn="ctr"/>
+            <a:endParaRPr lang="en-US"/>
+          </a:p>
+        </p:txBody>
+      </p:sp>
+      <p:sp>
+        <p:nvSpPr>
+          <p:cNvPr id="31" name="Rectangle 30">
+            <a:extLst>
+              <a:ext uri="{FF2B5EF4-FFF2-40B4-BE49-F238E27FC236}">
+                <a16:creationId xmlns:a16="http://schemas.microsoft.com/office/drawing/2014/main" id="{41B54FE0-63F8-CD13-D263-FE7A0DD48477}"/>
+              </a:ext>
+            </a:extLst>
+          </p:cNvPr>
+          <p:cNvSpPr/>
+          <p:nvPr/>
+        </p:nvSpPr>
+        <p:spPr>
+          <a:xfrm>
+            <a:off x="5279815" y="5345745"/>
+            <a:ext cx="636416" cy="173865"/>
+          </a:xfrm>
+          <a:prstGeom prst="rect">
+            <a:avLst/>
+          </a:prstGeom>
+          <a:solidFill>
+            <a:schemeClr val="bg1"/>
+          </a:solidFill>
+          <a:ln>
+            <a:solidFill>
+              <a:schemeClr val="bg1"/>
+            </a:solidFill>
+          </a:ln>
+        </p:spPr>
+        <p:style>
+          <a:lnRef idx="2">
+            <a:schemeClr val="accent1">
+              <a:shade val="15000"/>
+            </a:schemeClr>
+          </a:lnRef>
+          <a:fillRef idx="1">
+            <a:schemeClr val="accent1"/>
+          </a:fillRef>
+          <a:effectRef idx="0">
+            <a:schemeClr val="accent1"/>
+          </a:effectRef>
+          <a:fontRef idx="minor">
+            <a:schemeClr val="lt1"/>
+          </a:fontRef>
+        </p:style>
+        <p:txBody>
+          <a:bodyPr rtlCol="0" anchor="ctr"/>
+          <a:lstStyle/>
+          <a:p>
+            <a:pPr algn="ctr"/>
+            <a:endParaRPr lang="en-US"/>
+          </a:p>
+        </p:txBody>
+      </p:sp>
+      <p:sp>
+        <p:nvSpPr>
+          <p:cNvPr id="32" name="Rectangle 31">
+            <a:extLst>
+              <a:ext uri="{FF2B5EF4-FFF2-40B4-BE49-F238E27FC236}">
+                <a16:creationId xmlns:a16="http://schemas.microsoft.com/office/drawing/2014/main" id="{8D5E8CBE-6EC2-BDF1-924D-1C29DD3A66E1}"/>
+              </a:ext>
+            </a:extLst>
+          </p:cNvPr>
+          <p:cNvSpPr/>
+          <p:nvPr/>
+        </p:nvSpPr>
+        <p:spPr>
+          <a:xfrm>
+            <a:off x="5279815" y="3622122"/>
+            <a:ext cx="636416" cy="173865"/>
+          </a:xfrm>
+          <a:prstGeom prst="rect">
+            <a:avLst/>
+          </a:prstGeom>
+          <a:solidFill>
+            <a:schemeClr val="bg1"/>
+          </a:solidFill>
+          <a:ln>
+            <a:solidFill>
+              <a:schemeClr val="bg1"/>
+            </a:solidFill>
+          </a:ln>
+        </p:spPr>
+        <p:style>
+          <a:lnRef idx="2">
+            <a:schemeClr val="accent1">
+              <a:shade val="15000"/>
+            </a:schemeClr>
+          </a:lnRef>
+          <a:fillRef idx="1">
+            <a:schemeClr val="accent1"/>
+          </a:fillRef>
+          <a:effectRef idx="0">
+            <a:schemeClr val="accent1"/>
+          </a:effectRef>
+          <a:fontRef idx="minor">
+            <a:schemeClr val="lt1"/>
+          </a:fontRef>
+        </p:style>
+        <p:txBody>
+          <a:bodyPr rtlCol="0" anchor="ctr"/>
+          <a:lstStyle/>
+          <a:p>
+            <a:pPr algn="ctr"/>
+            <a:endParaRPr lang="en-US"/>
+          </a:p>
+        </p:txBody>
+      </p:sp>
+      <p:sp>
+        <p:nvSpPr>
+          <p:cNvPr id="33" name="Rectangle 32">
+            <a:extLst>
+              <a:ext uri="{FF2B5EF4-FFF2-40B4-BE49-F238E27FC236}">
+                <a16:creationId xmlns:a16="http://schemas.microsoft.com/office/drawing/2014/main" id="{08AAA919-AA82-9986-2FEF-14ADB7F0524A}"/>
+              </a:ext>
+            </a:extLst>
+          </p:cNvPr>
+          <p:cNvSpPr/>
+          <p:nvPr/>
+        </p:nvSpPr>
+        <p:spPr>
+          <a:xfrm>
+            <a:off x="5269616" y="1852908"/>
+            <a:ext cx="636416" cy="173865"/>
+          </a:xfrm>
+          <a:prstGeom prst="rect">
+            <a:avLst/>
+          </a:prstGeom>
+          <a:solidFill>
+            <a:schemeClr val="bg1"/>
+          </a:solidFill>
+          <a:ln>
+            <a:solidFill>
+              <a:schemeClr val="bg1"/>
+            </a:solidFill>
+          </a:ln>
+        </p:spPr>
+        <p:style>
+          <a:lnRef idx="2">
+            <a:schemeClr val="accent1">
+              <a:shade val="15000"/>
+            </a:schemeClr>
+          </a:lnRef>
+          <a:fillRef idx="1">
+            <a:schemeClr val="accent1"/>
+          </a:fillRef>
+          <a:effectRef idx="0">
+            <a:schemeClr val="accent1"/>
+          </a:effectRef>
+          <a:fontRef idx="minor">
+            <a:schemeClr val="lt1"/>
+          </a:fontRef>
+        </p:style>
+        <p:txBody>
+          <a:bodyPr rtlCol="0" anchor="ctr"/>
+          <a:lstStyle/>
+          <a:p>
+            <a:pPr algn="ctr"/>
+            <a:endParaRPr lang="en-US"/>
+          </a:p>
+        </p:txBody>
+      </p:sp>
+    </p:spTree>
+    <p:extLst>
+      <p:ext uri="{BB962C8B-B14F-4D97-AF65-F5344CB8AC3E}">
+        <p14:creationId xmlns:p14="http://schemas.microsoft.com/office/powerpoint/2010/main" val="400985926"/>
       </p:ext>
     </p:extLst>
   </p:cSld>

</xml_diff>

<commit_message>
first draft to committee
</commit_message>
<xml_diff>
--- a/chapter_notebooks/figure_editor.pptx
+++ b/chapter_notebooks/figure_editor.pptx
@@ -9,7 +9,9 @@
     <p:sldId id="260" r:id="rId3"/>
     <p:sldId id="259" r:id="rId4"/>
     <p:sldId id="261" r:id="rId5"/>
-    <p:sldId id="262" r:id="rId6"/>
+    <p:sldId id="263" r:id="rId6"/>
+    <p:sldId id="264" r:id="rId7"/>
+    <p:sldId id="262" r:id="rId8"/>
   </p:sldIdLst>
   <p:sldSz cx="12192000" cy="6858000"/>
   <p:notesSz cx="6858000" cy="9144000"/>
@@ -121,6 +123,8 @@
           <p14:sldIdLst>
             <p14:sldId id="259"/>
             <p14:sldId id="261"/>
+            <p14:sldId id="263"/>
+            <p14:sldId id="264"/>
             <p14:sldId id="262"/>
           </p14:sldIdLst>
         </p14:section>
@@ -280,7 +284,7 @@
           <a:p>
             <a:fld id="{0DF22B33-D0CB-4F00-A021-D190DB541D3D}" type="datetimeFigureOut">
               <a:rPr lang="en-US" smtClean="0"/>
-              <a:t>7/28/2024</a:t>
+              <a:t>7/29/2024</a:t>
             </a:fld>
             <a:endParaRPr lang="en-US"/>
           </a:p>
@@ -478,7 +482,7 @@
           <a:p>
             <a:fld id="{0DF22B33-D0CB-4F00-A021-D190DB541D3D}" type="datetimeFigureOut">
               <a:rPr lang="en-US" smtClean="0"/>
-              <a:t>7/28/2024</a:t>
+              <a:t>7/29/2024</a:t>
             </a:fld>
             <a:endParaRPr lang="en-US"/>
           </a:p>
@@ -686,7 +690,7 @@
           <a:p>
             <a:fld id="{0DF22B33-D0CB-4F00-A021-D190DB541D3D}" type="datetimeFigureOut">
               <a:rPr lang="en-US" smtClean="0"/>
-              <a:t>7/28/2024</a:t>
+              <a:t>7/29/2024</a:t>
             </a:fld>
             <a:endParaRPr lang="en-US"/>
           </a:p>
@@ -884,7 +888,7 @@
           <a:p>
             <a:fld id="{0DF22B33-D0CB-4F00-A021-D190DB541D3D}" type="datetimeFigureOut">
               <a:rPr lang="en-US" smtClean="0"/>
-              <a:t>7/28/2024</a:t>
+              <a:t>7/29/2024</a:t>
             </a:fld>
             <a:endParaRPr lang="en-US"/>
           </a:p>
@@ -1159,7 +1163,7 @@
           <a:p>
             <a:fld id="{0DF22B33-D0CB-4F00-A021-D190DB541D3D}" type="datetimeFigureOut">
               <a:rPr lang="en-US" smtClean="0"/>
-              <a:t>7/28/2024</a:t>
+              <a:t>7/29/2024</a:t>
             </a:fld>
             <a:endParaRPr lang="en-US"/>
           </a:p>
@@ -1424,7 +1428,7 @@
           <a:p>
             <a:fld id="{0DF22B33-D0CB-4F00-A021-D190DB541D3D}" type="datetimeFigureOut">
               <a:rPr lang="en-US" smtClean="0"/>
-              <a:t>7/28/2024</a:t>
+              <a:t>7/29/2024</a:t>
             </a:fld>
             <a:endParaRPr lang="en-US"/>
           </a:p>
@@ -1836,7 +1840,7 @@
           <a:p>
             <a:fld id="{0DF22B33-D0CB-4F00-A021-D190DB541D3D}" type="datetimeFigureOut">
               <a:rPr lang="en-US" smtClean="0"/>
-              <a:t>7/28/2024</a:t>
+              <a:t>7/29/2024</a:t>
             </a:fld>
             <a:endParaRPr lang="en-US"/>
           </a:p>
@@ -1977,7 +1981,7 @@
           <a:p>
             <a:fld id="{0DF22B33-D0CB-4F00-A021-D190DB541D3D}" type="datetimeFigureOut">
               <a:rPr lang="en-US" smtClean="0"/>
-              <a:t>7/28/2024</a:t>
+              <a:t>7/29/2024</a:t>
             </a:fld>
             <a:endParaRPr lang="en-US"/>
           </a:p>
@@ -2090,7 +2094,7 @@
           <a:p>
             <a:fld id="{0DF22B33-D0CB-4F00-A021-D190DB541D3D}" type="datetimeFigureOut">
               <a:rPr lang="en-US" smtClean="0"/>
-              <a:t>7/28/2024</a:t>
+              <a:t>7/29/2024</a:t>
             </a:fld>
             <a:endParaRPr lang="en-US"/>
           </a:p>
@@ -2401,7 +2405,7 @@
           <a:p>
             <a:fld id="{0DF22B33-D0CB-4F00-A021-D190DB541D3D}" type="datetimeFigureOut">
               <a:rPr lang="en-US" smtClean="0"/>
-              <a:t>7/28/2024</a:t>
+              <a:t>7/29/2024</a:t>
             </a:fld>
             <a:endParaRPr lang="en-US"/>
           </a:p>
@@ -2689,7 +2693,7 @@
           <a:p>
             <a:fld id="{0DF22B33-D0CB-4F00-A021-D190DB541D3D}" type="datetimeFigureOut">
               <a:rPr lang="en-US" smtClean="0"/>
-              <a:t>7/28/2024</a:t>
+              <a:t>7/29/2024</a:t>
             </a:fld>
             <a:endParaRPr lang="en-US"/>
           </a:p>
@@ -2930,7 +2934,7 @@
           <a:p>
             <a:fld id="{0DF22B33-D0CB-4F00-A021-D190DB541D3D}" type="datetimeFigureOut">
               <a:rPr lang="en-US" smtClean="0"/>
-              <a:t>7/28/2024</a:t>
+              <a:t>7/29/2024</a:t>
             </a:fld>
             <a:endParaRPr lang="en-US"/>
           </a:p>
@@ -4408,7 +4412,7 @@
         </p:blipFill>
         <p:spPr>
           <a:xfrm>
-            <a:off x="1557625" y="2422289"/>
+            <a:off x="3714225" y="2422289"/>
             <a:ext cx="2194137" cy="1645603"/>
           </a:xfrm>
           <a:prstGeom prst="rect">
@@ -4430,7 +4434,7 @@
         </p:nvSpPr>
         <p:spPr>
           <a:xfrm>
-            <a:off x="1667449" y="2469301"/>
+            <a:off x="3824049" y="2469301"/>
             <a:ext cx="2067060" cy="1545465"/>
           </a:xfrm>
           <a:prstGeom prst="rect">
@@ -4482,7 +4486,7 @@
         </p:nvSpPr>
         <p:spPr>
           <a:xfrm>
-            <a:off x="1245347" y="1722832"/>
+            <a:off x="3401947" y="1722832"/>
             <a:ext cx="2818691" cy="523220"/>
           </a:xfrm>
           <a:prstGeom prst="rect">
@@ -4539,7 +4543,7 @@
         </p:blipFill>
         <p:spPr>
           <a:xfrm>
-            <a:off x="5617157" y="2419231"/>
+            <a:off x="8187824" y="2419231"/>
             <a:ext cx="2194137" cy="1645603"/>
           </a:xfrm>
           <a:prstGeom prst="rect">
@@ -4561,7 +4565,7 @@
         </p:nvSpPr>
         <p:spPr>
           <a:xfrm>
-            <a:off x="4468482" y="1722832"/>
+            <a:off x="7039149" y="1722832"/>
             <a:ext cx="4491488" cy="738664"/>
           </a:xfrm>
           <a:prstGeom prst="rect">
@@ -4592,10 +4596,10 @@
       </p:sp>
       <p:sp>
         <p:nvSpPr>
-          <p:cNvPr id="13" name="TextBox 12">
-            <a:extLst>
-              <a:ext uri="{FF2B5EF4-FFF2-40B4-BE49-F238E27FC236}">
-                <a16:creationId xmlns:a16="http://schemas.microsoft.com/office/drawing/2014/main" id="{AE6B401D-B0BC-BD08-22AC-419348A7AE90}"/>
+          <p:cNvPr id="14" name="TextBox 13">
+            <a:extLst>
+              <a:ext uri="{FF2B5EF4-FFF2-40B4-BE49-F238E27FC236}">
+                <a16:creationId xmlns:a16="http://schemas.microsoft.com/office/drawing/2014/main" id="{BF46EF3C-A95F-E6F6-DC04-42F815CC101A}"/>
               </a:ext>
             </a:extLst>
           </p:cNvPr>
@@ -4604,8 +4608,8 @@
         </p:nvSpPr>
         <p:spPr>
           <a:xfrm>
-            <a:off x="2110596" y="4183913"/>
-            <a:ext cx="1184693" cy="307777"/>
+            <a:off x="8676654" y="4183913"/>
+            <a:ext cx="1607390" cy="307777"/>
           </a:xfrm>
           <a:prstGeom prst="rect">
             <a:avLst/>
@@ -4621,17 +4625,17 @@
             <a:pPr algn="ctr"/>
             <a:r>
               <a:rPr lang="en-US" sz="1400" dirty="0"/>
-              <a:t>250 Trials</a:t>
-            </a:r>
-          </a:p>
-        </p:txBody>
-      </p:sp>
-      <p:sp>
-        <p:nvSpPr>
-          <p:cNvPr id="14" name="TextBox 13">
-            <a:extLst>
-              <a:ext uri="{FF2B5EF4-FFF2-40B4-BE49-F238E27FC236}">
-                <a16:creationId xmlns:a16="http://schemas.microsoft.com/office/drawing/2014/main" id="{BF46EF3C-A95F-E6F6-DC04-42F815CC101A}"/>
+              <a:t>30 trials, 15 old</a:t>
+            </a:r>
+          </a:p>
+        </p:txBody>
+      </p:sp>
+      <p:sp>
+        <p:nvSpPr>
+          <p:cNvPr id="2" name="TextBox 1">
+            <a:extLst>
+              <a:ext uri="{FF2B5EF4-FFF2-40B4-BE49-F238E27FC236}">
+                <a16:creationId xmlns:a16="http://schemas.microsoft.com/office/drawing/2014/main" id="{8A2D0AEE-2B1F-C3FF-48A2-12D44B7B93D9}"/>
               </a:ext>
             </a:extLst>
           </p:cNvPr>
@@ -4640,8 +4644,8 @@
         </p:nvSpPr>
         <p:spPr>
           <a:xfrm>
-            <a:off x="6105987" y="4183913"/>
-            <a:ext cx="1607390" cy="307777"/>
+            <a:off x="3575494" y="4383414"/>
+            <a:ext cx="1184693" cy="307777"/>
           </a:xfrm>
           <a:prstGeom prst="rect">
             <a:avLst/>
@@ -4657,7 +4661,190 @@
             <a:pPr algn="ctr"/>
             <a:r>
               <a:rPr lang="en-US" sz="1400" dirty="0"/>
-              <a:t>30 trials, 15 old</a:t>
+              <a:t>250 Trials</a:t>
+            </a:r>
+          </a:p>
+        </p:txBody>
+      </p:sp>
+      <p:pic>
+        <p:nvPicPr>
+          <p:cNvPr id="3" name="Picture 2" descr="A grey triangle with black background&#10;&#10;Description automatically generated">
+            <a:extLst>
+              <a:ext uri="{FF2B5EF4-FFF2-40B4-BE49-F238E27FC236}">
+                <a16:creationId xmlns:a16="http://schemas.microsoft.com/office/drawing/2014/main" id="{16D0181D-C45D-C66C-8070-348B4957A790}"/>
+              </a:ext>
+            </a:extLst>
+          </p:cNvPr>
+          <p:cNvPicPr>
+            <a:picLocks noChangeAspect="1"/>
+          </p:cNvPicPr>
+          <p:nvPr/>
+        </p:nvPicPr>
+        <p:blipFill>
+          <a:blip r:embed="rId3">
+            <a:extLst>
+              <a:ext uri="{28A0092B-C50C-407E-A947-70E740481C1C}">
+                <a14:useLocalDpi xmlns:a14="http://schemas.microsoft.com/office/drawing/2010/main" val="0"/>
+              </a:ext>
+            </a:extLst>
+          </a:blip>
+          <a:stretch>
+            <a:fillRect/>
+          </a:stretch>
+        </p:blipFill>
+        <p:spPr>
+          <a:xfrm>
+            <a:off x="4470363" y="3299425"/>
+            <a:ext cx="2194137" cy="1645603"/>
+          </a:xfrm>
+          <a:prstGeom prst="rect">
+            <a:avLst/>
+          </a:prstGeom>
+        </p:spPr>
+      </p:pic>
+      <p:pic>
+        <p:nvPicPr>
+          <p:cNvPr id="4" name="Picture 3" descr="A grey triangle with black background&#10;&#10;Description automatically generated">
+            <a:extLst>
+              <a:ext uri="{FF2B5EF4-FFF2-40B4-BE49-F238E27FC236}">
+                <a16:creationId xmlns:a16="http://schemas.microsoft.com/office/drawing/2014/main" id="{B8B4BD1E-C5B3-1A15-0B93-CDC9429E7EA7}"/>
+              </a:ext>
+            </a:extLst>
+          </p:cNvPr>
+          <p:cNvPicPr>
+            <a:picLocks noChangeAspect="1"/>
+          </p:cNvPicPr>
+          <p:nvPr/>
+        </p:nvPicPr>
+        <p:blipFill>
+          <a:blip r:embed="rId4">
+            <a:extLst>
+              <a:ext uri="{28A0092B-C50C-407E-A947-70E740481C1C}">
+                <a14:useLocalDpi xmlns:a14="http://schemas.microsoft.com/office/drawing/2010/main" val="0"/>
+              </a:ext>
+            </a:extLst>
+          </a:blip>
+          <a:stretch>
+            <a:fillRect/>
+          </a:stretch>
+        </p:blipFill>
+        <p:spPr>
+          <a:xfrm>
+            <a:off x="5189363" y="4069100"/>
+            <a:ext cx="2194137" cy="1645603"/>
+          </a:xfrm>
+          <a:prstGeom prst="rect">
+            <a:avLst/>
+          </a:prstGeom>
+        </p:spPr>
+      </p:pic>
+      <p:cxnSp>
+        <p:nvCxnSpPr>
+          <p:cNvPr id="5" name="Straight Arrow Connector 4">
+            <a:extLst>
+              <a:ext uri="{FF2B5EF4-FFF2-40B4-BE49-F238E27FC236}">
+                <a16:creationId xmlns:a16="http://schemas.microsoft.com/office/drawing/2014/main" id="{4105F0E8-D69E-59B4-94FC-9471BA0A2CAF}"/>
+              </a:ext>
+            </a:extLst>
+          </p:cNvPr>
+          <p:cNvCxnSpPr/>
+          <p:nvPr/>
+        </p:nvCxnSpPr>
+        <p:spPr>
+          <a:xfrm>
+            <a:off x="3610427" y="3429000"/>
+            <a:ext cx="2121376" cy="1942381"/>
+          </a:xfrm>
+          <a:prstGeom prst="straightConnector1">
+            <a:avLst/>
+          </a:prstGeom>
+          <a:ln>
+            <a:tailEnd type="triangle"/>
+          </a:ln>
+        </p:spPr>
+        <p:style>
+          <a:lnRef idx="2">
+            <a:schemeClr val="accent1"/>
+          </a:lnRef>
+          <a:fillRef idx="0">
+            <a:schemeClr val="accent1"/>
+          </a:fillRef>
+          <a:effectRef idx="1">
+            <a:schemeClr val="accent1"/>
+          </a:effectRef>
+          <a:fontRef idx="minor">
+            <a:schemeClr val="tx1"/>
+          </a:fontRef>
+        </p:style>
+      </p:cxnSp>
+      <p:pic>
+        <p:nvPicPr>
+          <p:cNvPr id="12" name="Picture 11" descr="A network diagram of a triangle&#10;&#10;Description automatically generated with medium confidence">
+            <a:extLst>
+              <a:ext uri="{FF2B5EF4-FFF2-40B4-BE49-F238E27FC236}">
+                <a16:creationId xmlns:a16="http://schemas.microsoft.com/office/drawing/2014/main" id="{06B81BA4-29CF-27B4-ADC5-887E49657FCB}"/>
+              </a:ext>
+            </a:extLst>
+          </p:cNvPr>
+          <p:cNvPicPr>
+            <a:picLocks noChangeAspect="1"/>
+          </p:cNvPicPr>
+          <p:nvPr/>
+        </p:nvPicPr>
+        <p:blipFill>
+          <a:blip r:embed="rId5">
+            <a:extLst>
+              <a:ext uri="{28A0092B-C50C-407E-A947-70E740481C1C}">
+                <a14:useLocalDpi xmlns:a14="http://schemas.microsoft.com/office/drawing/2010/main" val="0"/>
+              </a:ext>
+            </a:extLst>
+          </a:blip>
+          <a:stretch>
+            <a:fillRect/>
+          </a:stretch>
+        </p:blipFill>
+        <p:spPr>
+          <a:xfrm>
+            <a:off x="193170" y="2461496"/>
+            <a:ext cx="3039188" cy="2279391"/>
+          </a:xfrm>
+          <a:prstGeom prst="rect">
+            <a:avLst/>
+          </a:prstGeom>
+        </p:spPr>
+      </p:pic>
+      <p:sp>
+        <p:nvSpPr>
+          <p:cNvPr id="15" name="TextBox 14">
+            <a:extLst>
+              <a:ext uri="{FF2B5EF4-FFF2-40B4-BE49-F238E27FC236}">
+                <a16:creationId xmlns:a16="http://schemas.microsoft.com/office/drawing/2014/main" id="{47883020-584D-E881-0155-2B043E15301D}"/>
+              </a:ext>
+            </a:extLst>
+          </p:cNvPr>
+          <p:cNvSpPr txBox="1"/>
+          <p:nvPr/>
+        </p:nvSpPr>
+        <p:spPr>
+          <a:xfrm>
+            <a:off x="174000" y="1830554"/>
+            <a:ext cx="3109789" cy="523220"/>
+          </a:xfrm>
+          <a:prstGeom prst="rect">
+            <a:avLst/>
+          </a:prstGeom>
+          <a:noFill/>
+        </p:spPr>
+        <p:txBody>
+          <a:bodyPr wrap="square" rtlCol="0">
+            <a:spAutoFit/>
+          </a:bodyPr>
+          <a:lstStyle/>
+          <a:p>
+            <a:pPr algn="ctr"/>
+            <a:r>
+              <a:rPr lang="en-US" sz="1400" dirty="0"/>
+              <a:t>Item presentation order determined by random walk through the graph</a:t>
             </a:r>
           </a:p>
         </p:txBody>
@@ -4676,6 +4863,964 @@
 </file>
 
 <file path=ppt/slides/slide5.xml><?xml version="1.0" encoding="utf-8"?>
+<p:sld xmlns:a="http://schemas.openxmlformats.org/drawingml/2006/main" xmlns:r="http://schemas.openxmlformats.org/officeDocument/2006/relationships" xmlns:p="http://schemas.openxmlformats.org/presentationml/2006/main">
+  <p:cSld>
+    <p:spTree>
+      <p:nvGrpSpPr>
+        <p:cNvPr id="1" name=""/>
+        <p:cNvGrpSpPr/>
+        <p:nvPr/>
+      </p:nvGrpSpPr>
+      <p:grpSpPr>
+        <a:xfrm>
+          <a:off x="0" y="0"/>
+          <a:ext cx="0" cy="0"/>
+          <a:chOff x="0" y="0"/>
+          <a:chExt cx="0" cy="0"/>
+        </a:xfrm>
+      </p:grpSpPr>
+      <p:sp>
+        <p:nvSpPr>
+          <p:cNvPr id="9" name="TextBox 8">
+            <a:extLst>
+              <a:ext uri="{FF2B5EF4-FFF2-40B4-BE49-F238E27FC236}">
+                <a16:creationId xmlns:a16="http://schemas.microsoft.com/office/drawing/2014/main" id="{52247EB9-FBB5-0555-074E-B83550791239}"/>
+              </a:ext>
+            </a:extLst>
+          </p:cNvPr>
+          <p:cNvSpPr txBox="1"/>
+          <p:nvPr/>
+        </p:nvSpPr>
+        <p:spPr>
+          <a:xfrm>
+            <a:off x="756512" y="1722832"/>
+            <a:ext cx="2818691" cy="738664"/>
+          </a:xfrm>
+          <a:prstGeom prst="rect">
+            <a:avLst/>
+          </a:prstGeom>
+          <a:noFill/>
+        </p:spPr>
+        <p:txBody>
+          <a:bodyPr wrap="square" rtlCol="0">
+            <a:spAutoFit/>
+          </a:bodyPr>
+          <a:lstStyle/>
+          <a:p>
+            <a:pPr algn="ctr"/>
+            <a:r>
+              <a:rPr lang="en-US" sz="1400" dirty="0"/>
+              <a:t>Exposure</a:t>
+            </a:r>
+          </a:p>
+          <a:p>
+            <a:pPr algn="ctr"/>
+            <a:r>
+              <a:rPr lang="en-US" sz="1400" dirty="0"/>
+              <a:t> </a:t>
+            </a:r>
+          </a:p>
+          <a:p>
+            <a:pPr algn="ctr"/>
+            <a:r>
+              <a:rPr lang="en-US" sz="1400" dirty="0"/>
+              <a:t>Is this item rotated?</a:t>
+            </a:r>
+          </a:p>
+        </p:txBody>
+      </p:sp>
+      <p:pic>
+        <p:nvPicPr>
+          <p:cNvPr id="10" name="Picture 9" descr="A grey triangle with a black background&#10;&#10;Description automatically generated">
+            <a:extLst>
+              <a:ext uri="{FF2B5EF4-FFF2-40B4-BE49-F238E27FC236}">
+                <a16:creationId xmlns:a16="http://schemas.microsoft.com/office/drawing/2014/main" id="{C7930837-2767-6AE4-E063-8CF963F8FDBE}"/>
+              </a:ext>
+            </a:extLst>
+          </p:cNvPr>
+          <p:cNvPicPr>
+            <a:picLocks noChangeAspect="1"/>
+          </p:cNvPicPr>
+          <p:nvPr/>
+        </p:nvPicPr>
+        <p:blipFill>
+          <a:blip r:embed="rId2">
+            <a:extLst>
+              <a:ext uri="{28A0092B-C50C-407E-A947-70E740481C1C}">
+                <a14:useLocalDpi xmlns:a14="http://schemas.microsoft.com/office/drawing/2010/main" val="0"/>
+              </a:ext>
+            </a:extLst>
+          </a:blip>
+          <a:stretch>
+            <a:fillRect/>
+          </a:stretch>
+        </p:blipFill>
+        <p:spPr>
+          <a:xfrm>
+            <a:off x="6801861" y="2419231"/>
+            <a:ext cx="2194137" cy="1645603"/>
+          </a:xfrm>
+          <a:prstGeom prst="rect">
+            <a:avLst/>
+          </a:prstGeom>
+        </p:spPr>
+      </p:pic>
+      <p:sp>
+        <p:nvSpPr>
+          <p:cNvPr id="11" name="TextBox 10">
+            <a:extLst>
+              <a:ext uri="{FF2B5EF4-FFF2-40B4-BE49-F238E27FC236}">
+                <a16:creationId xmlns:a16="http://schemas.microsoft.com/office/drawing/2014/main" id="{9B6DF95C-0554-0C24-017C-A65E1B8E6466}"/>
+              </a:ext>
+            </a:extLst>
+          </p:cNvPr>
+          <p:cNvSpPr txBox="1"/>
+          <p:nvPr/>
+        </p:nvSpPr>
+        <p:spPr>
+          <a:xfrm>
+            <a:off x="5653186" y="1722832"/>
+            <a:ext cx="4491488" cy="738664"/>
+          </a:xfrm>
+          <a:prstGeom prst="rect">
+            <a:avLst/>
+          </a:prstGeom>
+          <a:noFill/>
+        </p:spPr>
+        <p:txBody>
+          <a:bodyPr wrap="square" rtlCol="0">
+            <a:spAutoFit/>
+          </a:bodyPr>
+          <a:lstStyle/>
+          <a:p>
+            <a:pPr algn="ctr"/>
+            <a:r>
+              <a:rPr lang="en-US" sz="1400" dirty="0"/>
+              <a:t>Distance Judgment Test</a:t>
+            </a:r>
+          </a:p>
+          <a:p>
+            <a:pPr algn="ctr"/>
+            <a:endParaRPr lang="en-US" sz="1400" dirty="0"/>
+          </a:p>
+          <a:p>
+            <a:pPr algn="ctr"/>
+            <a:r>
+              <a:rPr lang="en-US" sz="1400" dirty="0"/>
+              <a:t>After seeing this item</a:t>
+            </a:r>
+          </a:p>
+        </p:txBody>
+      </p:sp>
+      <p:sp>
+        <p:nvSpPr>
+          <p:cNvPr id="13" name="TextBox 12">
+            <a:extLst>
+              <a:ext uri="{FF2B5EF4-FFF2-40B4-BE49-F238E27FC236}">
+                <a16:creationId xmlns:a16="http://schemas.microsoft.com/office/drawing/2014/main" id="{AE6B401D-B0BC-BD08-22AC-419348A7AE90}"/>
+              </a:ext>
+            </a:extLst>
+          </p:cNvPr>
+          <p:cNvSpPr txBox="1"/>
+          <p:nvPr/>
+        </p:nvSpPr>
+        <p:spPr>
+          <a:xfrm>
+            <a:off x="1418894" y="4383414"/>
+            <a:ext cx="1184693" cy="307777"/>
+          </a:xfrm>
+          <a:prstGeom prst="rect">
+            <a:avLst/>
+          </a:prstGeom>
+          <a:noFill/>
+        </p:spPr>
+        <p:txBody>
+          <a:bodyPr wrap="square">
+            <a:spAutoFit/>
+          </a:bodyPr>
+          <a:lstStyle/>
+          <a:p>
+            <a:pPr algn="ctr"/>
+            <a:r>
+              <a:rPr lang="en-US" sz="1400" dirty="0"/>
+              <a:t>300 Trials</a:t>
+            </a:r>
+          </a:p>
+        </p:txBody>
+      </p:sp>
+      <p:pic>
+        <p:nvPicPr>
+          <p:cNvPr id="2" name="Picture 1" descr="A grey triangle with a black background&#10;&#10;Description automatically generated">
+            <a:extLst>
+              <a:ext uri="{FF2B5EF4-FFF2-40B4-BE49-F238E27FC236}">
+                <a16:creationId xmlns:a16="http://schemas.microsoft.com/office/drawing/2014/main" id="{8DEA5D81-6AF0-2451-3DB3-91092B89C6E9}"/>
+              </a:ext>
+            </a:extLst>
+          </p:cNvPr>
+          <p:cNvPicPr>
+            <a:picLocks noChangeAspect="1"/>
+          </p:cNvPicPr>
+          <p:nvPr/>
+        </p:nvPicPr>
+        <p:blipFill>
+          <a:blip r:embed="rId2">
+            <a:extLst>
+              <a:ext uri="{28A0092B-C50C-407E-A947-70E740481C1C}">
+                <a14:useLocalDpi xmlns:a14="http://schemas.microsoft.com/office/drawing/2010/main" val="0"/>
+              </a:ext>
+            </a:extLst>
+          </a:blip>
+          <a:stretch>
+            <a:fillRect/>
+          </a:stretch>
+        </p:blipFill>
+        <p:spPr>
+          <a:xfrm>
+            <a:off x="1068790" y="2422289"/>
+            <a:ext cx="2194137" cy="1645603"/>
+          </a:xfrm>
+          <a:prstGeom prst="rect">
+            <a:avLst/>
+          </a:prstGeom>
+        </p:spPr>
+      </p:pic>
+      <p:pic>
+        <p:nvPicPr>
+          <p:cNvPr id="4" name="Picture 3" descr="A grey triangle with black background&#10;&#10;Description automatically generated">
+            <a:extLst>
+              <a:ext uri="{FF2B5EF4-FFF2-40B4-BE49-F238E27FC236}">
+                <a16:creationId xmlns:a16="http://schemas.microsoft.com/office/drawing/2014/main" id="{5E27499D-23C5-E2F0-B72C-6D03C760B995}"/>
+              </a:ext>
+            </a:extLst>
+          </p:cNvPr>
+          <p:cNvPicPr>
+            <a:picLocks noChangeAspect="1"/>
+          </p:cNvPicPr>
+          <p:nvPr/>
+        </p:nvPicPr>
+        <p:blipFill>
+          <a:blip r:embed="rId3">
+            <a:extLst>
+              <a:ext uri="{28A0092B-C50C-407E-A947-70E740481C1C}">
+                <a14:useLocalDpi xmlns:a14="http://schemas.microsoft.com/office/drawing/2010/main" val="0"/>
+              </a:ext>
+            </a:extLst>
+          </a:blip>
+          <a:stretch>
+            <a:fillRect/>
+          </a:stretch>
+        </p:blipFill>
+        <p:spPr>
+          <a:xfrm>
+            <a:off x="5824045" y="4337801"/>
+            <a:ext cx="2194137" cy="1645603"/>
+          </a:xfrm>
+          <a:prstGeom prst="rect">
+            <a:avLst/>
+          </a:prstGeom>
+        </p:spPr>
+      </p:pic>
+      <p:pic>
+        <p:nvPicPr>
+          <p:cNvPr id="6" name="Picture 5" descr="A grey triangle with black background&#10;&#10;Description automatically generated">
+            <a:extLst>
+              <a:ext uri="{FF2B5EF4-FFF2-40B4-BE49-F238E27FC236}">
+                <a16:creationId xmlns:a16="http://schemas.microsoft.com/office/drawing/2014/main" id="{98AB2106-C42D-A91E-33BE-004429141ACD}"/>
+              </a:ext>
+            </a:extLst>
+          </p:cNvPr>
+          <p:cNvPicPr>
+            <a:picLocks noChangeAspect="1"/>
+          </p:cNvPicPr>
+          <p:nvPr/>
+        </p:nvPicPr>
+        <p:blipFill>
+          <a:blip r:embed="rId4">
+            <a:extLst>
+              <a:ext uri="{28A0092B-C50C-407E-A947-70E740481C1C}">
+                <a14:useLocalDpi xmlns:a14="http://schemas.microsoft.com/office/drawing/2010/main" val="0"/>
+              </a:ext>
+            </a:extLst>
+          </a:blip>
+          <a:stretch>
+            <a:fillRect/>
+          </a:stretch>
+        </p:blipFill>
+        <p:spPr>
+          <a:xfrm>
+            <a:off x="8518301" y="4337801"/>
+            <a:ext cx="2194137" cy="1645603"/>
+          </a:xfrm>
+          <a:prstGeom prst="rect">
+            <a:avLst/>
+          </a:prstGeom>
+        </p:spPr>
+      </p:pic>
+      <p:sp>
+        <p:nvSpPr>
+          <p:cNvPr id="17" name="TextBox 16">
+            <a:extLst>
+              <a:ext uri="{FF2B5EF4-FFF2-40B4-BE49-F238E27FC236}">
+                <a16:creationId xmlns:a16="http://schemas.microsoft.com/office/drawing/2014/main" id="{86DF4DE4-A939-04C9-E5D2-2AE03E3AD611}"/>
+              </a:ext>
+            </a:extLst>
+          </p:cNvPr>
+          <p:cNvSpPr txBox="1"/>
+          <p:nvPr/>
+        </p:nvSpPr>
+        <p:spPr>
+          <a:xfrm>
+            <a:off x="5296617" y="4183913"/>
+            <a:ext cx="6096000" cy="307777"/>
+          </a:xfrm>
+          <a:prstGeom prst="rect">
+            <a:avLst/>
+          </a:prstGeom>
+          <a:noFill/>
+        </p:spPr>
+        <p:txBody>
+          <a:bodyPr wrap="square">
+            <a:spAutoFit/>
+          </a:bodyPr>
+          <a:lstStyle/>
+          <a:p>
+            <a:pPr algn="ctr"/>
+            <a:r>
+              <a:rPr lang="en-US" sz="1400" dirty="0"/>
+              <a:t>Which of the following items was likely to appear first?</a:t>
+            </a:r>
+          </a:p>
+        </p:txBody>
+      </p:sp>
+      <p:pic>
+        <p:nvPicPr>
+          <p:cNvPr id="18" name="Picture 17" descr="A grey triangle with black background&#10;&#10;Description automatically generated">
+            <a:extLst>
+              <a:ext uri="{FF2B5EF4-FFF2-40B4-BE49-F238E27FC236}">
+                <a16:creationId xmlns:a16="http://schemas.microsoft.com/office/drawing/2014/main" id="{5B9314DC-CC88-45F7-6D40-1478CB6A65A8}"/>
+              </a:ext>
+            </a:extLst>
+          </p:cNvPr>
+          <p:cNvPicPr>
+            <a:picLocks noChangeAspect="1"/>
+          </p:cNvPicPr>
+          <p:nvPr/>
+        </p:nvPicPr>
+        <p:blipFill>
+          <a:blip r:embed="rId3">
+            <a:extLst>
+              <a:ext uri="{28A0092B-C50C-407E-A947-70E740481C1C}">
+                <a14:useLocalDpi xmlns:a14="http://schemas.microsoft.com/office/drawing/2010/main" val="0"/>
+              </a:ext>
+            </a:extLst>
+          </a:blip>
+          <a:stretch>
+            <a:fillRect/>
+          </a:stretch>
+        </p:blipFill>
+        <p:spPr>
+          <a:xfrm>
+            <a:off x="2387851" y="3361111"/>
+            <a:ext cx="2194137" cy="1645603"/>
+          </a:xfrm>
+          <a:prstGeom prst="rect">
+            <a:avLst/>
+          </a:prstGeom>
+        </p:spPr>
+      </p:pic>
+      <p:pic>
+        <p:nvPicPr>
+          <p:cNvPr id="19" name="Picture 18" descr="A grey triangle with black background&#10;&#10;Description automatically generated">
+            <a:extLst>
+              <a:ext uri="{FF2B5EF4-FFF2-40B4-BE49-F238E27FC236}">
+                <a16:creationId xmlns:a16="http://schemas.microsoft.com/office/drawing/2014/main" id="{D767E15E-A296-B5A5-B559-352587B953F7}"/>
+              </a:ext>
+            </a:extLst>
+          </p:cNvPr>
+          <p:cNvPicPr>
+            <a:picLocks noChangeAspect="1"/>
+          </p:cNvPicPr>
+          <p:nvPr/>
+        </p:nvPicPr>
+        <p:blipFill>
+          <a:blip r:embed="rId4">
+            <a:extLst>
+              <a:ext uri="{28A0092B-C50C-407E-A947-70E740481C1C}">
+                <a14:useLocalDpi xmlns:a14="http://schemas.microsoft.com/office/drawing/2010/main" val="0"/>
+              </a:ext>
+            </a:extLst>
+          </a:blip>
+          <a:stretch>
+            <a:fillRect/>
+          </a:stretch>
+        </p:blipFill>
+        <p:spPr>
+          <a:xfrm>
+            <a:off x="3184865" y="4046498"/>
+            <a:ext cx="2194137" cy="1645603"/>
+          </a:xfrm>
+          <a:prstGeom prst="rect">
+            <a:avLst/>
+          </a:prstGeom>
+        </p:spPr>
+      </p:pic>
+      <p:cxnSp>
+        <p:nvCxnSpPr>
+          <p:cNvPr id="21" name="Straight Arrow Connector 20">
+            <a:extLst>
+              <a:ext uri="{FF2B5EF4-FFF2-40B4-BE49-F238E27FC236}">
+                <a16:creationId xmlns:a16="http://schemas.microsoft.com/office/drawing/2014/main" id="{12C232E1-4C06-1981-F985-E004D8475459}"/>
+              </a:ext>
+            </a:extLst>
+          </p:cNvPr>
+          <p:cNvCxnSpPr/>
+          <p:nvPr/>
+        </p:nvCxnSpPr>
+        <p:spPr>
+          <a:xfrm>
+            <a:off x="1453827" y="3429000"/>
+            <a:ext cx="2121376" cy="1942381"/>
+          </a:xfrm>
+          <a:prstGeom prst="straightConnector1">
+            <a:avLst/>
+          </a:prstGeom>
+          <a:ln>
+            <a:tailEnd type="triangle"/>
+          </a:ln>
+        </p:spPr>
+        <p:style>
+          <a:lnRef idx="2">
+            <a:schemeClr val="accent1"/>
+          </a:lnRef>
+          <a:fillRef idx="0">
+            <a:schemeClr val="accent1"/>
+          </a:fillRef>
+          <a:effectRef idx="1">
+            <a:schemeClr val="accent1"/>
+          </a:effectRef>
+          <a:fontRef idx="minor">
+            <a:schemeClr val="tx1"/>
+          </a:fontRef>
+        </p:style>
+      </p:cxnSp>
+    </p:spTree>
+    <p:extLst>
+      <p:ext uri="{BB962C8B-B14F-4D97-AF65-F5344CB8AC3E}">
+        <p14:creationId xmlns:p14="http://schemas.microsoft.com/office/powerpoint/2010/main" val="3474983700"/>
+      </p:ext>
+    </p:extLst>
+  </p:cSld>
+  <p:clrMapOvr>
+    <a:masterClrMapping/>
+  </p:clrMapOvr>
+</p:sld>
+</file>
+
+<file path=ppt/slides/slide6.xml><?xml version="1.0" encoding="utf-8"?>
+<p:sld xmlns:a="http://schemas.openxmlformats.org/drawingml/2006/main" xmlns:r="http://schemas.openxmlformats.org/officeDocument/2006/relationships" xmlns:p="http://schemas.openxmlformats.org/presentationml/2006/main">
+  <p:cSld>
+    <p:spTree>
+      <p:nvGrpSpPr>
+        <p:cNvPr id="1" name=""/>
+        <p:cNvGrpSpPr/>
+        <p:nvPr/>
+      </p:nvGrpSpPr>
+      <p:grpSpPr>
+        <a:xfrm>
+          <a:off x="0" y="0"/>
+          <a:ext cx="0" cy="0"/>
+          <a:chOff x="0" y="0"/>
+          <a:chExt cx="0" cy="0"/>
+        </a:xfrm>
+      </p:grpSpPr>
+      <p:sp>
+        <p:nvSpPr>
+          <p:cNvPr id="15" name="Rectangle 14">
+            <a:extLst>
+              <a:ext uri="{FF2B5EF4-FFF2-40B4-BE49-F238E27FC236}">
+                <a16:creationId xmlns:a16="http://schemas.microsoft.com/office/drawing/2014/main" id="{976D17F6-913C-3E25-ABD1-0424690B6EC2}"/>
+              </a:ext>
+            </a:extLst>
+          </p:cNvPr>
+          <p:cNvSpPr/>
+          <p:nvPr/>
+        </p:nvSpPr>
+        <p:spPr>
+          <a:xfrm>
+            <a:off x="1783726" y="1687134"/>
+            <a:ext cx="1513268" cy="1545465"/>
+          </a:xfrm>
+          <a:prstGeom prst="rect">
+            <a:avLst/>
+          </a:prstGeom>
+        </p:spPr>
+        <p:style>
+          <a:lnRef idx="1">
+            <a:schemeClr val="dk1"/>
+          </a:lnRef>
+          <a:fillRef idx="3">
+            <a:schemeClr val="dk1"/>
+          </a:fillRef>
+          <a:effectRef idx="2">
+            <a:schemeClr val="dk1"/>
+          </a:effectRef>
+          <a:fontRef idx="minor">
+            <a:schemeClr val="lt1"/>
+          </a:fontRef>
+        </p:style>
+        <p:txBody>
+          <a:bodyPr rtlCol="0" anchor="ctr"/>
+          <a:lstStyle/>
+          <a:p>
+            <a:pPr algn="ctr"/>
+            <a:endParaRPr lang="en-US"/>
+          </a:p>
+        </p:txBody>
+      </p:sp>
+      <p:pic>
+        <p:nvPicPr>
+          <p:cNvPr id="9" name="Picture 8" descr="A cartoon character in a green dress&#10;&#10;Description automatically generated">
+            <a:extLst>
+              <a:ext uri="{FF2B5EF4-FFF2-40B4-BE49-F238E27FC236}">
+                <a16:creationId xmlns:a16="http://schemas.microsoft.com/office/drawing/2014/main" id="{183BF994-41EF-D34C-142D-FFC83C985F46}"/>
+              </a:ext>
+            </a:extLst>
+          </p:cNvPr>
+          <p:cNvPicPr>
+            <a:picLocks noChangeAspect="1"/>
+          </p:cNvPicPr>
+          <p:nvPr/>
+        </p:nvPicPr>
+        <p:blipFill>
+          <a:blip r:embed="rId2">
+            <a:extLst>
+              <a:ext uri="{28A0092B-C50C-407E-A947-70E740481C1C}">
+                <a14:useLocalDpi xmlns:a14="http://schemas.microsoft.com/office/drawing/2010/main" val="0"/>
+              </a:ext>
+            </a:extLst>
+          </a:blip>
+          <a:stretch>
+            <a:fillRect/>
+          </a:stretch>
+        </p:blipFill>
+        <p:spPr>
+          <a:xfrm>
+            <a:off x="1540538" y="1555122"/>
+            <a:ext cx="1986570" cy="1986570"/>
+          </a:xfrm>
+          <a:prstGeom prst="rect">
+            <a:avLst/>
+          </a:prstGeom>
+        </p:spPr>
+      </p:pic>
+      <p:sp>
+        <p:nvSpPr>
+          <p:cNvPr id="16" name="Rectangle 15">
+            <a:extLst>
+              <a:ext uri="{FF2B5EF4-FFF2-40B4-BE49-F238E27FC236}">
+                <a16:creationId xmlns:a16="http://schemas.microsoft.com/office/drawing/2014/main" id="{A9FBA0E5-8A48-52FC-F9CF-BDCE8024CC83}"/>
+              </a:ext>
+            </a:extLst>
+          </p:cNvPr>
+          <p:cNvSpPr/>
+          <p:nvPr/>
+        </p:nvSpPr>
+        <p:spPr>
+          <a:xfrm>
+            <a:off x="2591876" y="2700272"/>
+            <a:ext cx="1513268" cy="1545465"/>
+          </a:xfrm>
+          <a:prstGeom prst="rect">
+            <a:avLst/>
+          </a:prstGeom>
+        </p:spPr>
+        <p:style>
+          <a:lnRef idx="1">
+            <a:schemeClr val="dk1"/>
+          </a:lnRef>
+          <a:fillRef idx="3">
+            <a:schemeClr val="dk1"/>
+          </a:fillRef>
+          <a:effectRef idx="2">
+            <a:schemeClr val="dk1"/>
+          </a:effectRef>
+          <a:fontRef idx="minor">
+            <a:schemeClr val="lt1"/>
+          </a:fontRef>
+        </p:style>
+        <p:txBody>
+          <a:bodyPr rtlCol="0" anchor="ctr"/>
+          <a:lstStyle/>
+          <a:p>
+            <a:pPr algn="ctr"/>
+            <a:endParaRPr lang="en-US"/>
+          </a:p>
+        </p:txBody>
+      </p:sp>
+      <p:pic>
+        <p:nvPicPr>
+          <p:cNvPr id="12" name="Picture 11" descr="A cartoon character in a green dress&#10;&#10;Description automatically generated">
+            <a:extLst>
+              <a:ext uri="{FF2B5EF4-FFF2-40B4-BE49-F238E27FC236}">
+                <a16:creationId xmlns:a16="http://schemas.microsoft.com/office/drawing/2014/main" id="{A57CB8FC-DF63-010F-6CDF-93196477CF2D}"/>
+              </a:ext>
+            </a:extLst>
+          </p:cNvPr>
+          <p:cNvPicPr>
+            <a:picLocks noChangeAspect="1"/>
+          </p:cNvPicPr>
+          <p:nvPr/>
+        </p:nvPicPr>
+        <p:blipFill>
+          <a:blip r:embed="rId3">
+            <a:extLst>
+              <a:ext uri="{28A0092B-C50C-407E-A947-70E740481C1C}">
+                <a14:useLocalDpi xmlns:a14="http://schemas.microsoft.com/office/drawing/2010/main" val="0"/>
+              </a:ext>
+            </a:extLst>
+          </a:blip>
+          <a:stretch>
+            <a:fillRect/>
+          </a:stretch>
+        </p:blipFill>
+        <p:spPr>
+          <a:xfrm>
+            <a:off x="2339027" y="2533913"/>
+            <a:ext cx="1986571" cy="1986571"/>
+          </a:xfrm>
+          <a:prstGeom prst="rect">
+            <a:avLst/>
+          </a:prstGeom>
+        </p:spPr>
+      </p:pic>
+      <p:sp>
+        <p:nvSpPr>
+          <p:cNvPr id="17" name="Rectangle 16">
+            <a:extLst>
+              <a:ext uri="{FF2B5EF4-FFF2-40B4-BE49-F238E27FC236}">
+                <a16:creationId xmlns:a16="http://schemas.microsoft.com/office/drawing/2014/main" id="{6AE48900-D1B7-6E42-9BD7-18943EB121B5}"/>
+              </a:ext>
+            </a:extLst>
+          </p:cNvPr>
+          <p:cNvSpPr/>
+          <p:nvPr/>
+        </p:nvSpPr>
+        <p:spPr>
+          <a:xfrm>
+            <a:off x="3460127" y="3758486"/>
+            <a:ext cx="1513268" cy="1545465"/>
+          </a:xfrm>
+          <a:prstGeom prst="rect">
+            <a:avLst/>
+          </a:prstGeom>
+        </p:spPr>
+        <p:style>
+          <a:lnRef idx="1">
+            <a:schemeClr val="dk1"/>
+          </a:lnRef>
+          <a:fillRef idx="3">
+            <a:schemeClr val="dk1"/>
+          </a:fillRef>
+          <a:effectRef idx="2">
+            <a:schemeClr val="dk1"/>
+          </a:effectRef>
+          <a:fontRef idx="minor">
+            <a:schemeClr val="lt1"/>
+          </a:fontRef>
+        </p:style>
+        <p:txBody>
+          <a:bodyPr rtlCol="0" anchor="ctr"/>
+          <a:lstStyle/>
+          <a:p>
+            <a:pPr algn="ctr"/>
+            <a:endParaRPr lang="en-US"/>
+          </a:p>
+        </p:txBody>
+      </p:sp>
+      <p:cxnSp>
+        <p:nvCxnSpPr>
+          <p:cNvPr id="19" name="Straight Arrow Connector 18">
+            <a:extLst>
+              <a:ext uri="{FF2B5EF4-FFF2-40B4-BE49-F238E27FC236}">
+                <a16:creationId xmlns:a16="http://schemas.microsoft.com/office/drawing/2014/main" id="{BA641DC9-97C2-5459-2134-99204FCE348B}"/>
+              </a:ext>
+            </a:extLst>
+          </p:cNvPr>
+          <p:cNvCxnSpPr/>
+          <p:nvPr/>
+        </p:nvCxnSpPr>
+        <p:spPr>
+          <a:xfrm>
+            <a:off x="1229932" y="3335628"/>
+            <a:ext cx="1603420" cy="1968323"/>
+          </a:xfrm>
+          <a:prstGeom prst="straightConnector1">
+            <a:avLst/>
+          </a:prstGeom>
+          <a:ln>
+            <a:tailEnd type="triangle"/>
+          </a:ln>
+        </p:spPr>
+        <p:style>
+          <a:lnRef idx="2">
+            <a:schemeClr val="accent1"/>
+          </a:lnRef>
+          <a:fillRef idx="0">
+            <a:schemeClr val="accent1"/>
+          </a:fillRef>
+          <a:effectRef idx="1">
+            <a:schemeClr val="accent1"/>
+          </a:effectRef>
+          <a:fontRef idx="minor">
+            <a:schemeClr val="tx1"/>
+          </a:fontRef>
+        </p:style>
+      </p:cxnSp>
+      <p:sp>
+        <p:nvSpPr>
+          <p:cNvPr id="20" name="TextBox 19">
+            <a:extLst>
+              <a:ext uri="{FF2B5EF4-FFF2-40B4-BE49-F238E27FC236}">
+                <a16:creationId xmlns:a16="http://schemas.microsoft.com/office/drawing/2014/main" id="{276FAE66-A775-8511-563E-13F4F2141859}"/>
+              </a:ext>
+            </a:extLst>
+          </p:cNvPr>
+          <p:cNvSpPr txBox="1"/>
+          <p:nvPr/>
+        </p:nvSpPr>
+        <p:spPr>
+          <a:xfrm>
+            <a:off x="885419" y="4330518"/>
+            <a:ext cx="1208477" cy="369332"/>
+          </a:xfrm>
+          <a:prstGeom prst="rect">
+            <a:avLst/>
+          </a:prstGeom>
+          <a:noFill/>
+        </p:spPr>
+        <p:txBody>
+          <a:bodyPr wrap="square" rtlCol="0">
+            <a:spAutoFit/>
+          </a:bodyPr>
+          <a:lstStyle/>
+          <a:p>
+            <a:pPr algn="ctr"/>
+            <a:r>
+              <a:rPr lang="en-US" dirty="0"/>
+              <a:t>300 trials</a:t>
+            </a:r>
+          </a:p>
+        </p:txBody>
+      </p:sp>
+      <p:pic>
+        <p:nvPicPr>
+          <p:cNvPr id="1030" name="Picture 6">
+            <a:extLst>
+              <a:ext uri="{FF2B5EF4-FFF2-40B4-BE49-F238E27FC236}">
+                <a16:creationId xmlns:a16="http://schemas.microsoft.com/office/drawing/2014/main" id="{7008B167-6095-4D08-1D99-D9468266E317}"/>
+              </a:ext>
+            </a:extLst>
+          </p:cNvPr>
+          <p:cNvPicPr>
+            <a:picLocks noChangeAspect="1" noChangeArrowheads="1"/>
+          </p:cNvPicPr>
+          <p:nvPr/>
+        </p:nvPicPr>
+        <p:blipFill>
+          <a:blip r:embed="rId4">
+            <a:extLst>
+              <a:ext uri="{28A0092B-C50C-407E-A947-70E740481C1C}">
+                <a14:useLocalDpi xmlns:a14="http://schemas.microsoft.com/office/drawing/2010/main" val="0"/>
+              </a:ext>
+            </a:extLst>
+          </a:blip>
+          <a:srcRect/>
+          <a:stretch>
+            <a:fillRect/>
+          </a:stretch>
+        </p:blipFill>
+        <p:spPr bwMode="auto">
+          <a:xfrm>
+            <a:off x="6803064" y="1864283"/>
+            <a:ext cx="4435964" cy="2650901"/>
+          </a:xfrm>
+          <a:prstGeom prst="rect">
+            <a:avLst/>
+          </a:prstGeom>
+          <a:noFill/>
+          <a:extLst>
+            <a:ext uri="{909E8E84-426E-40DD-AFC4-6F175D3DCCD1}">
+              <a14:hiddenFill xmlns:a14="http://schemas.microsoft.com/office/drawing/2010/main">
+                <a:solidFill>
+                  <a:srgbClr val="FFFFFF"/>
+                </a:solidFill>
+              </a14:hiddenFill>
+            </a:ext>
+          </a:extLst>
+        </p:spPr>
+      </p:pic>
+      <p:sp>
+        <p:nvSpPr>
+          <p:cNvPr id="21" name="TextBox 20">
+            <a:extLst>
+              <a:ext uri="{FF2B5EF4-FFF2-40B4-BE49-F238E27FC236}">
+                <a16:creationId xmlns:a16="http://schemas.microsoft.com/office/drawing/2014/main" id="{6F30CE5C-F300-854F-AC87-4CA957BFEC67}"/>
+              </a:ext>
+            </a:extLst>
+          </p:cNvPr>
+          <p:cNvSpPr txBox="1"/>
+          <p:nvPr/>
+        </p:nvSpPr>
+        <p:spPr>
+          <a:xfrm>
+            <a:off x="7395089" y="1205108"/>
+            <a:ext cx="3251915" cy="369332"/>
+          </a:xfrm>
+          <a:prstGeom prst="rect">
+            <a:avLst/>
+          </a:prstGeom>
+          <a:noFill/>
+        </p:spPr>
+        <p:txBody>
+          <a:bodyPr wrap="square" rtlCol="0">
+            <a:spAutoFit/>
+          </a:bodyPr>
+          <a:lstStyle/>
+          <a:p>
+            <a:pPr algn="ctr"/>
+            <a:r>
+              <a:rPr lang="en-US" dirty="0"/>
+              <a:t>Categorization Test</a:t>
+            </a:r>
+          </a:p>
+        </p:txBody>
+      </p:sp>
+      <p:pic>
+        <p:nvPicPr>
+          <p:cNvPr id="14" name="Picture 13" descr="A cartoon character in a green dress&#10;&#10;Description automatically generated">
+            <a:extLst>
+              <a:ext uri="{FF2B5EF4-FFF2-40B4-BE49-F238E27FC236}">
+                <a16:creationId xmlns:a16="http://schemas.microsoft.com/office/drawing/2014/main" id="{5C95F0A8-5E5A-C221-9DDB-66636B54C417}"/>
+              </a:ext>
+            </a:extLst>
+          </p:cNvPr>
+          <p:cNvPicPr>
+            <a:picLocks noChangeAspect="1"/>
+          </p:cNvPicPr>
+          <p:nvPr/>
+        </p:nvPicPr>
+        <p:blipFill>
+          <a:blip r:embed="rId5">
+            <a:extLst>
+              <a:ext uri="{28A0092B-C50C-407E-A947-70E740481C1C}">
+                <a14:useLocalDpi xmlns:a14="http://schemas.microsoft.com/office/drawing/2010/main" val="0"/>
+              </a:ext>
+            </a:extLst>
+          </a:blip>
+          <a:stretch>
+            <a:fillRect/>
+          </a:stretch>
+        </p:blipFill>
+        <p:spPr>
+          <a:xfrm>
+            <a:off x="3243766" y="3561010"/>
+            <a:ext cx="1986570" cy="1986570"/>
+          </a:xfrm>
+          <a:prstGeom prst="rect">
+            <a:avLst/>
+          </a:prstGeom>
+        </p:spPr>
+      </p:pic>
+      <p:sp>
+        <p:nvSpPr>
+          <p:cNvPr id="22" name="TextBox 21">
+            <a:extLst>
+              <a:ext uri="{FF2B5EF4-FFF2-40B4-BE49-F238E27FC236}">
+                <a16:creationId xmlns:a16="http://schemas.microsoft.com/office/drawing/2014/main" id="{C3BCBBC2-3207-514C-D457-69E6070D261D}"/>
+              </a:ext>
+            </a:extLst>
+          </p:cNvPr>
+          <p:cNvSpPr txBox="1"/>
+          <p:nvPr/>
+        </p:nvSpPr>
+        <p:spPr>
+          <a:xfrm>
+            <a:off x="7330697" y="2820401"/>
+            <a:ext cx="3566979" cy="307777"/>
+          </a:xfrm>
+          <a:prstGeom prst="rect">
+            <a:avLst/>
+          </a:prstGeom>
+          <a:noFill/>
+        </p:spPr>
+        <p:txBody>
+          <a:bodyPr wrap="square" rtlCol="0">
+            <a:spAutoFit/>
+          </a:bodyPr>
+          <a:lstStyle/>
+          <a:p>
+            <a:pPr algn="ctr"/>
+            <a:r>
+              <a:rPr lang="en-US" sz="1400" dirty="0">
+                <a:solidFill>
+                  <a:schemeClr val="bg1"/>
+                </a:solidFill>
+              </a:rPr>
+              <a:t>Which category does this alien belong to?</a:t>
+            </a:r>
+          </a:p>
+        </p:txBody>
+      </p:sp>
+      <p:sp>
+        <p:nvSpPr>
+          <p:cNvPr id="23" name="TextBox 22">
+            <a:extLst>
+              <a:ext uri="{FF2B5EF4-FFF2-40B4-BE49-F238E27FC236}">
+                <a16:creationId xmlns:a16="http://schemas.microsoft.com/office/drawing/2014/main" id="{98788952-E428-E585-94DF-AE505A822461}"/>
+              </a:ext>
+            </a:extLst>
+          </p:cNvPr>
+          <p:cNvSpPr txBox="1"/>
+          <p:nvPr/>
+        </p:nvSpPr>
+        <p:spPr>
+          <a:xfrm>
+            <a:off x="1671036" y="1223355"/>
+            <a:ext cx="3251915" cy="369332"/>
+          </a:xfrm>
+          <a:prstGeom prst="rect">
+            <a:avLst/>
+          </a:prstGeom>
+          <a:noFill/>
+        </p:spPr>
+        <p:txBody>
+          <a:bodyPr wrap="square" rtlCol="0">
+            <a:spAutoFit/>
+          </a:bodyPr>
+          <a:lstStyle/>
+          <a:p>
+            <a:pPr algn="ctr"/>
+            <a:r>
+              <a:rPr lang="en-US" dirty="0"/>
+              <a:t>Exposure</a:t>
+            </a:r>
+          </a:p>
+        </p:txBody>
+      </p:sp>
+    </p:spTree>
+    <p:extLst>
+      <p:ext uri="{BB962C8B-B14F-4D97-AF65-F5344CB8AC3E}">
+        <p14:creationId xmlns:p14="http://schemas.microsoft.com/office/powerpoint/2010/main" val="1199002921"/>
+      </p:ext>
+    </p:extLst>
+  </p:cSld>
+  <p:clrMapOvr>
+    <a:masterClrMapping/>
+  </p:clrMapOvr>
+</p:sld>
+</file>
+
+<file path=ppt/slides/slide7.xml><?xml version="1.0" encoding="utf-8"?>
 <p:sld xmlns:a="http://schemas.openxmlformats.org/drawingml/2006/main" xmlns:r="http://schemas.openxmlformats.org/officeDocument/2006/relationships" xmlns:p="http://schemas.openxmlformats.org/presentationml/2006/main">
   <p:cSld>
     <p:spTree>

</xml_diff>

<commit_message>
chapter 2 writing updates done
</commit_message>
<xml_diff>
--- a/chapter_notebooks/figure_editor.pptx
+++ b/chapter_notebooks/figure_editor.pptx
@@ -12,6 +12,9 @@
     <p:sldId id="263" r:id="rId6"/>
     <p:sldId id="264" r:id="rId7"/>
     <p:sldId id="262" r:id="rId8"/>
+    <p:sldId id="265" r:id="rId9"/>
+    <p:sldId id="267" r:id="rId10"/>
+    <p:sldId id="266" r:id="rId11"/>
   </p:sldIdLst>
   <p:sldSz cx="12192000" cy="6858000"/>
   <p:notesSz cx="6858000" cy="9144000"/>
@@ -126,6 +129,9 @@
             <p14:sldId id="263"/>
             <p14:sldId id="264"/>
             <p14:sldId id="262"/>
+            <p14:sldId id="265"/>
+            <p14:sldId id="267"/>
+            <p14:sldId id="266"/>
           </p14:sldIdLst>
         </p14:section>
       </p14:sectionLst>
@@ -284,7 +290,7 @@
           <a:p>
             <a:fld id="{0DF22B33-D0CB-4F00-A021-D190DB541D3D}" type="datetimeFigureOut">
               <a:rPr lang="en-US" smtClean="0"/>
-              <a:t>7/29/2024</a:t>
+              <a:t>8/9/2024</a:t>
             </a:fld>
             <a:endParaRPr lang="en-US"/>
           </a:p>
@@ -482,7 +488,7 @@
           <a:p>
             <a:fld id="{0DF22B33-D0CB-4F00-A021-D190DB541D3D}" type="datetimeFigureOut">
               <a:rPr lang="en-US" smtClean="0"/>
-              <a:t>7/29/2024</a:t>
+              <a:t>8/9/2024</a:t>
             </a:fld>
             <a:endParaRPr lang="en-US"/>
           </a:p>
@@ -690,7 +696,7 @@
           <a:p>
             <a:fld id="{0DF22B33-D0CB-4F00-A021-D190DB541D3D}" type="datetimeFigureOut">
               <a:rPr lang="en-US" smtClean="0"/>
-              <a:t>7/29/2024</a:t>
+              <a:t>8/9/2024</a:t>
             </a:fld>
             <a:endParaRPr lang="en-US"/>
           </a:p>
@@ -888,7 +894,7 @@
           <a:p>
             <a:fld id="{0DF22B33-D0CB-4F00-A021-D190DB541D3D}" type="datetimeFigureOut">
               <a:rPr lang="en-US" smtClean="0"/>
-              <a:t>7/29/2024</a:t>
+              <a:t>8/9/2024</a:t>
             </a:fld>
             <a:endParaRPr lang="en-US"/>
           </a:p>
@@ -1163,7 +1169,7 @@
           <a:p>
             <a:fld id="{0DF22B33-D0CB-4F00-A021-D190DB541D3D}" type="datetimeFigureOut">
               <a:rPr lang="en-US" smtClean="0"/>
-              <a:t>7/29/2024</a:t>
+              <a:t>8/9/2024</a:t>
             </a:fld>
             <a:endParaRPr lang="en-US"/>
           </a:p>
@@ -1428,7 +1434,7 @@
           <a:p>
             <a:fld id="{0DF22B33-D0CB-4F00-A021-D190DB541D3D}" type="datetimeFigureOut">
               <a:rPr lang="en-US" smtClean="0"/>
-              <a:t>7/29/2024</a:t>
+              <a:t>8/9/2024</a:t>
             </a:fld>
             <a:endParaRPr lang="en-US"/>
           </a:p>
@@ -1840,7 +1846,7 @@
           <a:p>
             <a:fld id="{0DF22B33-D0CB-4F00-A021-D190DB541D3D}" type="datetimeFigureOut">
               <a:rPr lang="en-US" smtClean="0"/>
-              <a:t>7/29/2024</a:t>
+              <a:t>8/9/2024</a:t>
             </a:fld>
             <a:endParaRPr lang="en-US"/>
           </a:p>
@@ -1981,7 +1987,7 @@
           <a:p>
             <a:fld id="{0DF22B33-D0CB-4F00-A021-D190DB541D3D}" type="datetimeFigureOut">
               <a:rPr lang="en-US" smtClean="0"/>
-              <a:t>7/29/2024</a:t>
+              <a:t>8/9/2024</a:t>
             </a:fld>
             <a:endParaRPr lang="en-US"/>
           </a:p>
@@ -2094,7 +2100,7 @@
           <a:p>
             <a:fld id="{0DF22B33-D0CB-4F00-A021-D190DB541D3D}" type="datetimeFigureOut">
               <a:rPr lang="en-US" smtClean="0"/>
-              <a:t>7/29/2024</a:t>
+              <a:t>8/9/2024</a:t>
             </a:fld>
             <a:endParaRPr lang="en-US"/>
           </a:p>
@@ -2405,7 +2411,7 @@
           <a:p>
             <a:fld id="{0DF22B33-D0CB-4F00-A021-D190DB541D3D}" type="datetimeFigureOut">
               <a:rPr lang="en-US" smtClean="0"/>
-              <a:t>7/29/2024</a:t>
+              <a:t>8/9/2024</a:t>
             </a:fld>
             <a:endParaRPr lang="en-US"/>
           </a:p>
@@ -2693,7 +2699,7 @@
           <a:p>
             <a:fld id="{0DF22B33-D0CB-4F00-A021-D190DB541D3D}" type="datetimeFigureOut">
               <a:rPr lang="en-US" smtClean="0"/>
-              <a:t>7/29/2024</a:t>
+              <a:t>8/9/2024</a:t>
             </a:fld>
             <a:endParaRPr lang="en-US"/>
           </a:p>
@@ -2934,7 +2940,7 @@
           <a:p>
             <a:fld id="{0DF22B33-D0CB-4F00-A021-D190DB541D3D}" type="datetimeFigureOut">
               <a:rPr lang="en-US" smtClean="0"/>
-              <a:t>7/29/2024</a:t>
+              <a:t>8/9/2024</a:t>
             </a:fld>
             <a:endParaRPr lang="en-US"/>
           </a:p>
@@ -3414,6 +3420,156 @@
 </p:sld>
 </file>
 
+<file path=ppt/slides/slide10.xml><?xml version="1.0" encoding="utf-8"?>
+<p:sld xmlns:a="http://schemas.openxmlformats.org/drawingml/2006/main" xmlns:r="http://schemas.openxmlformats.org/officeDocument/2006/relationships" xmlns:p="http://schemas.openxmlformats.org/presentationml/2006/main">
+  <p:cSld>
+    <p:spTree>
+      <p:nvGrpSpPr>
+        <p:cNvPr id="1" name=""/>
+        <p:cNvGrpSpPr/>
+        <p:nvPr/>
+      </p:nvGrpSpPr>
+      <p:grpSpPr>
+        <a:xfrm>
+          <a:off x="0" y="0"/>
+          <a:ext cx="0" cy="0"/>
+          <a:chOff x="0" y="0"/>
+          <a:chExt cx="0" cy="0"/>
+        </a:xfrm>
+      </p:grpSpPr>
+      <p:pic>
+        <p:nvPicPr>
+          <p:cNvPr id="7" name="Picture 6">
+            <a:extLst>
+              <a:ext uri="{FF2B5EF4-FFF2-40B4-BE49-F238E27FC236}">
+                <a16:creationId xmlns:a16="http://schemas.microsoft.com/office/drawing/2014/main" id="{3B4D2498-078F-7BE4-F730-C9B3F7208416}"/>
+              </a:ext>
+            </a:extLst>
+          </p:cNvPr>
+          <p:cNvPicPr>
+            <a:picLocks noChangeAspect="1"/>
+          </p:cNvPicPr>
+          <p:nvPr/>
+        </p:nvPicPr>
+        <p:blipFill>
+          <a:blip r:embed="rId2"/>
+          <a:stretch>
+            <a:fillRect/>
+          </a:stretch>
+        </p:blipFill>
+        <p:spPr>
+          <a:xfrm>
+            <a:off x="5405102" y="1754544"/>
+            <a:ext cx="6134100" cy="4314825"/>
+          </a:xfrm>
+          <a:prstGeom prst="rect">
+            <a:avLst/>
+          </a:prstGeom>
+        </p:spPr>
+      </p:pic>
+      <p:pic>
+        <p:nvPicPr>
+          <p:cNvPr id="5" name="Picture 4">
+            <a:extLst>
+              <a:ext uri="{FF2B5EF4-FFF2-40B4-BE49-F238E27FC236}">
+                <a16:creationId xmlns:a16="http://schemas.microsoft.com/office/drawing/2014/main" id="{43EFF8EA-A620-9B7E-144A-68F7DF5FA827}"/>
+              </a:ext>
+            </a:extLst>
+          </p:cNvPr>
+          <p:cNvPicPr>
+            <a:picLocks noChangeAspect="1"/>
+          </p:cNvPicPr>
+          <p:nvPr/>
+        </p:nvPicPr>
+        <p:blipFill>
+          <a:blip r:embed="rId3"/>
+          <a:stretch>
+            <a:fillRect/>
+          </a:stretch>
+        </p:blipFill>
+        <p:spPr>
+          <a:xfrm>
+            <a:off x="440297" y="1754545"/>
+            <a:ext cx="6134100" cy="4314825"/>
+          </a:xfrm>
+          <a:prstGeom prst="rect">
+            <a:avLst/>
+          </a:prstGeom>
+        </p:spPr>
+      </p:pic>
+      <p:pic>
+        <p:nvPicPr>
+          <p:cNvPr id="10" name="Picture 9">
+            <a:extLst>
+              <a:ext uri="{FF2B5EF4-FFF2-40B4-BE49-F238E27FC236}">
+                <a16:creationId xmlns:a16="http://schemas.microsoft.com/office/drawing/2014/main" id="{ED4D8323-7773-203C-ABDF-85C3DF42A5C9}"/>
+              </a:ext>
+            </a:extLst>
+          </p:cNvPr>
+          <p:cNvPicPr>
+            <a:picLocks noChangeAspect="1"/>
+          </p:cNvPicPr>
+          <p:nvPr/>
+        </p:nvPicPr>
+        <p:blipFill>
+          <a:blip r:embed="rId4"/>
+          <a:stretch>
+            <a:fillRect/>
+          </a:stretch>
+        </p:blipFill>
+        <p:spPr>
+          <a:xfrm>
+            <a:off x="7989850" y="1363963"/>
+            <a:ext cx="2133898" cy="390580"/>
+          </a:xfrm>
+          <a:prstGeom prst="rect">
+            <a:avLst/>
+          </a:prstGeom>
+        </p:spPr>
+      </p:pic>
+      <p:pic>
+        <p:nvPicPr>
+          <p:cNvPr id="13" name="Picture 12">
+            <a:extLst>
+              <a:ext uri="{FF2B5EF4-FFF2-40B4-BE49-F238E27FC236}">
+                <a16:creationId xmlns:a16="http://schemas.microsoft.com/office/drawing/2014/main" id="{BD629F66-18F6-EE80-7DDF-E47F81E3F8A1}"/>
+              </a:ext>
+            </a:extLst>
+          </p:cNvPr>
+          <p:cNvPicPr>
+            <a:picLocks noChangeAspect="1"/>
+          </p:cNvPicPr>
+          <p:nvPr/>
+        </p:nvPicPr>
+        <p:blipFill>
+          <a:blip r:embed="rId5"/>
+          <a:stretch>
+            <a:fillRect/>
+          </a:stretch>
+        </p:blipFill>
+        <p:spPr>
+          <a:xfrm>
+            <a:off x="3021964" y="1363963"/>
+            <a:ext cx="2181529" cy="381053"/>
+          </a:xfrm>
+          <a:prstGeom prst="rect">
+            <a:avLst/>
+          </a:prstGeom>
+        </p:spPr>
+      </p:pic>
+    </p:spTree>
+    <p:extLst>
+      <p:ext uri="{BB962C8B-B14F-4D97-AF65-F5344CB8AC3E}">
+        <p14:creationId xmlns:p14="http://schemas.microsoft.com/office/powerpoint/2010/main" val="2214082577"/>
+      </p:ext>
+    </p:extLst>
+  </p:cSld>
+  <p:clrMapOvr>
+    <a:masterClrMapping/>
+  </p:clrMapOvr>
+</p:sld>
+</file>
+
 <file path=ppt/slides/slide2.xml><?xml version="1.0" encoding="utf-8"?>
 <p:sld xmlns:a="http://schemas.openxmlformats.org/drawingml/2006/main" xmlns:r="http://schemas.openxmlformats.org/officeDocument/2006/relationships" xmlns:p="http://schemas.openxmlformats.org/presentationml/2006/main">
   <p:cSld>
@@ -6765,6 +6921,282 @@
     <p:extLst>
       <p:ext uri="{BB962C8B-B14F-4D97-AF65-F5344CB8AC3E}">
         <p14:creationId xmlns:p14="http://schemas.microsoft.com/office/powerpoint/2010/main" val="400985926"/>
+      </p:ext>
+    </p:extLst>
+  </p:cSld>
+  <p:clrMapOvr>
+    <a:masterClrMapping/>
+  </p:clrMapOvr>
+</p:sld>
+</file>
+
+<file path=ppt/slides/slide8.xml><?xml version="1.0" encoding="utf-8"?>
+<p:sld xmlns:a="http://schemas.openxmlformats.org/drawingml/2006/main" xmlns:r="http://schemas.openxmlformats.org/officeDocument/2006/relationships" xmlns:p="http://schemas.openxmlformats.org/presentationml/2006/main">
+  <p:cSld>
+    <p:spTree>
+      <p:nvGrpSpPr>
+        <p:cNvPr id="1" name=""/>
+        <p:cNvGrpSpPr/>
+        <p:nvPr/>
+      </p:nvGrpSpPr>
+      <p:grpSpPr>
+        <a:xfrm>
+          <a:off x="0" y="0"/>
+          <a:ext cx="0" cy="0"/>
+          <a:chOff x="0" y="0"/>
+          <a:chExt cx="0" cy="0"/>
+        </a:xfrm>
+      </p:grpSpPr>
+      <p:pic>
+        <p:nvPicPr>
+          <p:cNvPr id="1026" name="Picture 2">
+            <a:extLst>
+              <a:ext uri="{FF2B5EF4-FFF2-40B4-BE49-F238E27FC236}">
+                <a16:creationId xmlns:a16="http://schemas.microsoft.com/office/drawing/2014/main" id="{A7D75E50-760E-5A28-C405-A175D934E220}"/>
+              </a:ext>
+            </a:extLst>
+          </p:cNvPr>
+          <p:cNvPicPr>
+            <a:picLocks noChangeAspect="1" noChangeArrowheads="1"/>
+          </p:cNvPicPr>
+          <p:nvPr/>
+        </p:nvPicPr>
+        <p:blipFill>
+          <a:blip r:embed="rId2">
+            <a:extLst>
+              <a:ext uri="{28A0092B-C50C-407E-A947-70E740481C1C}">
+                <a14:useLocalDpi xmlns:a14="http://schemas.microsoft.com/office/drawing/2010/main" val="0"/>
+              </a:ext>
+            </a:extLst>
+          </a:blip>
+          <a:srcRect/>
+          <a:stretch>
+            <a:fillRect/>
+          </a:stretch>
+        </p:blipFill>
+        <p:spPr bwMode="auto">
+          <a:xfrm>
+            <a:off x="2286000" y="1119188"/>
+            <a:ext cx="7620000" cy="4619625"/>
+          </a:xfrm>
+          <a:prstGeom prst="rect">
+            <a:avLst/>
+          </a:prstGeom>
+          <a:noFill/>
+          <a:extLst>
+            <a:ext uri="{909E8E84-426E-40DD-AFC4-6F175D3DCCD1}">
+              <a14:hiddenFill xmlns:a14="http://schemas.microsoft.com/office/drawing/2010/main">
+                <a:solidFill>
+                  <a:srgbClr val="FFFFFF"/>
+                </a:solidFill>
+              </a14:hiddenFill>
+            </a:ext>
+          </a:extLst>
+        </p:spPr>
+      </p:pic>
+      <p:sp>
+        <p:nvSpPr>
+          <p:cNvPr id="4" name="Rectangle 3">
+            <a:extLst>
+              <a:ext uri="{FF2B5EF4-FFF2-40B4-BE49-F238E27FC236}">
+                <a16:creationId xmlns:a16="http://schemas.microsoft.com/office/drawing/2014/main" id="{C460836B-CE4C-0103-9969-F360430009FB}"/>
+              </a:ext>
+            </a:extLst>
+          </p:cNvPr>
+          <p:cNvSpPr/>
+          <p:nvPr/>
+        </p:nvSpPr>
+        <p:spPr>
+          <a:xfrm>
+            <a:off x="2286000" y="1136440"/>
+            <a:ext cx="7920507" cy="528034"/>
+          </a:xfrm>
+          <a:prstGeom prst="rect">
+            <a:avLst/>
+          </a:prstGeom>
+          <a:solidFill>
+            <a:schemeClr val="bg1"/>
+          </a:solidFill>
+          <a:ln>
+            <a:solidFill>
+              <a:schemeClr val="bg1"/>
+            </a:solidFill>
+          </a:ln>
+        </p:spPr>
+        <p:style>
+          <a:lnRef idx="2">
+            <a:schemeClr val="accent1">
+              <a:shade val="15000"/>
+            </a:schemeClr>
+          </a:lnRef>
+          <a:fillRef idx="1">
+            <a:schemeClr val="accent1"/>
+          </a:fillRef>
+          <a:effectRef idx="0">
+            <a:schemeClr val="accent1"/>
+          </a:effectRef>
+          <a:fontRef idx="minor">
+            <a:schemeClr val="lt1"/>
+          </a:fontRef>
+        </p:style>
+        <p:txBody>
+          <a:bodyPr rtlCol="0" anchor="ctr"/>
+          <a:lstStyle/>
+          <a:p>
+            <a:pPr algn="ctr"/>
+            <a:r>
+              <a:rPr lang="en-US" dirty="0">
+                <a:solidFill>
+                  <a:sysClr val="windowText" lastClr="000000"/>
+                </a:solidFill>
+              </a:rPr>
+              <a:t>Boundary – Non Boundary Nodes</a:t>
+            </a:r>
+          </a:p>
+          <a:p>
+            <a:pPr algn="ctr"/>
+            <a:r>
+              <a:rPr lang="en-US" dirty="0">
+                <a:solidFill>
+                  <a:sysClr val="windowText" lastClr="000000"/>
+                </a:solidFill>
+              </a:rPr>
+              <a:t>Block 1 – Block 0</a:t>
+            </a:r>
+          </a:p>
+        </p:txBody>
+      </p:sp>
+    </p:spTree>
+    <p:extLst>
+      <p:ext uri="{BB962C8B-B14F-4D97-AF65-F5344CB8AC3E}">
+        <p14:creationId xmlns:p14="http://schemas.microsoft.com/office/powerpoint/2010/main" val="2326810607"/>
+      </p:ext>
+    </p:extLst>
+  </p:cSld>
+  <p:clrMapOvr>
+    <a:masterClrMapping/>
+  </p:clrMapOvr>
+</p:sld>
+</file>
+
+<file path=ppt/slides/slide9.xml><?xml version="1.0" encoding="utf-8"?>
+<p:sld xmlns:a="http://schemas.openxmlformats.org/drawingml/2006/main" xmlns:r="http://schemas.openxmlformats.org/officeDocument/2006/relationships" xmlns:p="http://schemas.openxmlformats.org/presentationml/2006/main">
+  <p:cSld>
+    <p:spTree>
+      <p:nvGrpSpPr>
+        <p:cNvPr id="1" name=""/>
+        <p:cNvGrpSpPr/>
+        <p:nvPr/>
+      </p:nvGrpSpPr>
+      <p:grpSpPr>
+        <a:xfrm>
+          <a:off x="0" y="0"/>
+          <a:ext cx="0" cy="0"/>
+          <a:chOff x="0" y="0"/>
+          <a:chExt cx="0" cy="0"/>
+        </a:xfrm>
+      </p:grpSpPr>
+      <p:sp>
+        <p:nvSpPr>
+          <p:cNvPr id="2" name="Title 1">
+            <a:extLst>
+              <a:ext uri="{FF2B5EF4-FFF2-40B4-BE49-F238E27FC236}">
+                <a16:creationId xmlns:a16="http://schemas.microsoft.com/office/drawing/2014/main" id="{00CFA3A1-5AF7-5466-63A5-B706B9AC5B6A}"/>
+              </a:ext>
+            </a:extLst>
+          </p:cNvPr>
+          <p:cNvSpPr>
+            <a:spLocks noGrp="1"/>
+          </p:cNvSpPr>
+          <p:nvPr>
+            <p:ph type="title"/>
+          </p:nvPr>
+        </p:nvSpPr>
+        <p:spPr/>
+        <p:txBody>
+          <a:bodyPr/>
+          <a:lstStyle/>
+          <a:p>
+            <a:endParaRPr lang="en-US"/>
+          </a:p>
+        </p:txBody>
+      </p:sp>
+      <p:sp>
+        <p:nvSpPr>
+          <p:cNvPr id="3" name="Content Placeholder 2">
+            <a:extLst>
+              <a:ext uri="{FF2B5EF4-FFF2-40B4-BE49-F238E27FC236}">
+                <a16:creationId xmlns:a16="http://schemas.microsoft.com/office/drawing/2014/main" id="{E042FF24-FA39-06F7-7CD4-E57BC8111E49}"/>
+              </a:ext>
+            </a:extLst>
+          </p:cNvPr>
+          <p:cNvSpPr>
+            <a:spLocks noGrp="1"/>
+          </p:cNvSpPr>
+          <p:nvPr>
+            <p:ph idx="1"/>
+          </p:nvPr>
+        </p:nvSpPr>
+        <p:spPr/>
+        <p:txBody>
+          <a:bodyPr/>
+          <a:lstStyle/>
+          <a:p>
+            <a:endParaRPr lang="en-US"/>
+          </a:p>
+        </p:txBody>
+      </p:sp>
+      <p:pic>
+        <p:nvPicPr>
+          <p:cNvPr id="2050" name="Picture 2">
+            <a:extLst>
+              <a:ext uri="{FF2B5EF4-FFF2-40B4-BE49-F238E27FC236}">
+                <a16:creationId xmlns:a16="http://schemas.microsoft.com/office/drawing/2014/main" id="{8BB48B95-3767-6D9C-44E8-E425C63A6958}"/>
+              </a:ext>
+            </a:extLst>
+          </p:cNvPr>
+          <p:cNvPicPr>
+            <a:picLocks noChangeAspect="1" noChangeArrowheads="1"/>
+          </p:cNvPicPr>
+          <p:nvPr/>
+        </p:nvPicPr>
+        <p:blipFill>
+          <a:blip r:embed="rId2">
+            <a:extLst>
+              <a:ext uri="{28A0092B-C50C-407E-A947-70E740481C1C}">
+                <a14:useLocalDpi xmlns:a14="http://schemas.microsoft.com/office/drawing/2010/main" val="0"/>
+              </a:ext>
+            </a:extLst>
+          </a:blip>
+          <a:srcRect/>
+          <a:stretch>
+            <a:fillRect/>
+          </a:stretch>
+        </p:blipFill>
+        <p:spPr bwMode="auto">
+          <a:xfrm>
+            <a:off x="3652838" y="1047750"/>
+            <a:ext cx="4886325" cy="4762500"/>
+          </a:xfrm>
+          <a:prstGeom prst="rect">
+            <a:avLst/>
+          </a:prstGeom>
+          <a:noFill/>
+          <a:extLst>
+            <a:ext uri="{909E8E84-426E-40DD-AFC4-6F175D3DCCD1}">
+              <a14:hiddenFill xmlns:a14="http://schemas.microsoft.com/office/drawing/2010/main">
+                <a:solidFill>
+                  <a:srgbClr val="FFFFFF"/>
+                </a:solidFill>
+              </a14:hiddenFill>
+            </a:ext>
+          </a:extLst>
+        </p:spPr>
+      </p:pic>
+    </p:spTree>
+    <p:extLst>
+      <p:ext uri="{BB962C8B-B14F-4D97-AF65-F5344CB8AC3E}">
+        <p14:creationId xmlns:p14="http://schemas.microsoft.com/office/powerpoint/2010/main" val="3513239379"/>
       </p:ext>
     </p:extLst>
   </p:cSld>

</xml_diff>